<commit_message>
aufg5 ppt final montag
</commit_message>
<xml_diff>
--- a/05/trendelenburg_schomacker.pptx
+++ b/05/trendelenburg_schomacker.pptx
@@ -5,7 +5,7 @@
     <p:sldMasterId id="2147483648" r:id="rId1"/>
   </p:sldMasterIdLst>
   <p:notesMasterIdLst>
-    <p:notesMasterId r:id="rId18"/>
+    <p:notesMasterId r:id="rId28"/>
   </p:notesMasterIdLst>
   <p:sldIdLst>
     <p:sldId id="256" r:id="rId2"/>
@@ -24,6 +24,16 @@
     <p:sldId id="273" r:id="rId15"/>
     <p:sldId id="274" r:id="rId16"/>
     <p:sldId id="275" r:id="rId17"/>
+    <p:sldId id="276" r:id="rId18"/>
+    <p:sldId id="277" r:id="rId19"/>
+    <p:sldId id="278" r:id="rId20"/>
+    <p:sldId id="280" r:id="rId21"/>
+    <p:sldId id="281" r:id="rId22"/>
+    <p:sldId id="282" r:id="rId23"/>
+    <p:sldId id="283" r:id="rId24"/>
+    <p:sldId id="286" r:id="rId25"/>
+    <p:sldId id="285" r:id="rId26"/>
+    <p:sldId id="279" r:id="rId27"/>
   </p:sldIdLst>
   <p:sldSz cx="12192000" cy="6858000"/>
   <p:notesSz cx="6858000" cy="9144000"/>
@@ -212,7 +222,7 @@
           <a:p>
             <a:fld id="{CA79D802-BDBD-4A9E-AE3F-5EEF6E9CB312}" type="datetimeFigureOut">
               <a:rPr lang="de-DE" smtClean="0"/>
-              <a:t>14.05.2019</a:t>
+              <a:t>27.05.2019</a:t>
             </a:fld>
             <a:endParaRPr lang="de-DE"/>
           </a:p>
@@ -610,9 +620,9 @@
           <a:bodyPr/>
           <a:lstStyle/>
           <a:p>
-            <a:fld id="{5D2D46CF-9E47-4987-82EF-FB75DB19C652}" type="datetime1">
+            <a:fld id="{2EB090AC-5555-4A2F-9140-956B225138F0}" type="datetime1">
               <a:rPr lang="de-DE" smtClean="0"/>
-              <a:t>14.05.2019</a:t>
+              <a:t>27.05.2019</a:t>
             </a:fld>
             <a:endParaRPr lang="de-DE"/>
           </a:p>
@@ -642,9 +652,10 @@
           </a:lstStyle>
           <a:p>
             <a:r>
-              <a:rPr lang="de-DE" dirty="0"/>
-              <a:t>Thorben Schomacker</a:t>
-            </a:r>
+              <a:rPr lang="de-DE"/>
+              <a:t>Thorben Schomacker &amp; Ferdinand Trendelenburg</a:t>
+            </a:r>
+            <a:endParaRPr lang="de-DE" dirty="0"/>
           </a:p>
         </p:txBody>
       </p:sp>
@@ -864,9 +875,9 @@
           <a:bodyPr/>
           <a:lstStyle/>
           <a:p>
-            <a:fld id="{E2FFD448-6519-4396-A4FE-BAC5F127A36A}" type="datetime1">
+            <a:fld id="{FB57CF1D-5751-4EDE-8443-57ADFE54276A}" type="datetime1">
               <a:rPr lang="de-DE" smtClean="0"/>
-              <a:t>14.05.2019</a:t>
+              <a:t>27.05.2019</a:t>
             </a:fld>
             <a:endParaRPr lang="de-DE"/>
           </a:p>
@@ -889,7 +900,7 @@
           <a:p>
             <a:r>
               <a:rPr lang="de-DE"/>
-              <a:t>Thorben Schomacker</a:t>
+              <a:t>Thorben Schomacker &amp; Ferdinand Trendelenburg</a:t>
             </a:r>
           </a:p>
         </p:txBody>
@@ -1045,9 +1056,9 @@
           <a:bodyPr/>
           <a:lstStyle/>
           <a:p>
-            <a:fld id="{BCB05A31-0D43-4B03-A421-62EB1EB55EEB}" type="datetime1">
+            <a:fld id="{8AAFBFD9-0C9D-4087-9C18-901B0E150042}" type="datetime1">
               <a:rPr lang="de-DE" smtClean="0"/>
-              <a:t>14.05.2019</a:t>
+              <a:t>27.05.2019</a:t>
             </a:fld>
             <a:endParaRPr lang="de-DE"/>
           </a:p>
@@ -1070,7 +1081,7 @@
           <a:p>
             <a:r>
               <a:rPr lang="de-DE"/>
-              <a:t>Thorben Schomacker</a:t>
+              <a:t>Thorben Schomacker &amp; Ferdinand Trendelenburg</a:t>
             </a:r>
           </a:p>
         </p:txBody>
@@ -1229,9 +1240,9 @@
           <a:bodyPr/>
           <a:lstStyle/>
           <a:p>
-            <a:fld id="{290A7330-2663-482B-943B-7CAF68DE1D59}" type="datetime1">
+            <a:fld id="{34AB5111-DC3E-474E-A743-5D868EE8513C}" type="datetime1">
               <a:rPr lang="de-DE" smtClean="0"/>
-              <a:t>14.05.2019</a:t>
+              <a:t>27.05.2019</a:t>
             </a:fld>
             <a:endParaRPr lang="de-DE"/>
           </a:p>
@@ -1253,9 +1264,10 @@
           <a:lstStyle/>
           <a:p>
             <a:r>
-              <a:rPr lang="de-DE" dirty="0"/>
-              <a:t>Thorben Schomacker</a:t>
-            </a:r>
+              <a:rPr lang="de-DE"/>
+              <a:t>Thorben Schomacker &amp; Ferdinand Trendelenburg</a:t>
+            </a:r>
+            <a:endParaRPr lang="de-DE" dirty="0"/>
           </a:p>
         </p:txBody>
       </p:sp>
@@ -1556,9 +1568,9 @@
           <a:bodyPr/>
           <a:lstStyle/>
           <a:p>
-            <a:fld id="{17C154B3-9B0A-416B-8470-F4808599660F}" type="datetime1">
+            <a:fld id="{552796B6-069B-4E57-9A20-93766B885FDB}" type="datetime1">
               <a:rPr lang="de-DE" smtClean="0"/>
-              <a:t>14.05.2019</a:t>
+              <a:t>27.05.2019</a:t>
             </a:fld>
             <a:endParaRPr lang="de-DE"/>
           </a:p>
@@ -1580,9 +1592,10 @@
           <a:lstStyle/>
           <a:p>
             <a:r>
-              <a:rPr lang="de-DE" dirty="0"/>
-              <a:t>Thorben Schomacker</a:t>
-            </a:r>
+              <a:rPr lang="de-DE"/>
+              <a:t>Thorben Schomacker &amp; Ferdinand Trendelenburg</a:t>
+            </a:r>
+            <a:endParaRPr lang="de-DE" dirty="0"/>
           </a:p>
         </p:txBody>
       </p:sp>
@@ -1841,9 +1854,9 @@
           <a:bodyPr/>
           <a:lstStyle/>
           <a:p>
-            <a:fld id="{9B066FFF-3034-40BD-8544-CD26425FF750}" type="datetime1">
+            <a:fld id="{3308901F-C871-48F0-B8A9-CD9471B04CCA}" type="datetime1">
               <a:rPr lang="de-DE" smtClean="0"/>
-              <a:t>14.05.2019</a:t>
+              <a:t>27.05.2019</a:t>
             </a:fld>
             <a:endParaRPr lang="de-DE"/>
           </a:p>
@@ -1866,7 +1879,7 @@
           <a:p>
             <a:r>
               <a:rPr lang="de-DE"/>
-              <a:t>Thorben Schomacker</a:t>
+              <a:t>Thorben Schomacker &amp; Ferdinand Trendelenburg</a:t>
             </a:r>
           </a:p>
         </p:txBody>
@@ -2416,7 +2429,7 @@
           <a:p>
             <a:r>
               <a:rPr lang="de-DE"/>
-              <a:t>Thorben Schomacker</a:t>
+              <a:t>Thorben Schomacker &amp; Ferdinand Trendelenburg</a:t>
             </a:r>
           </a:p>
         </p:txBody>
@@ -2883,9 +2896,9 @@
           <a:bodyPr/>
           <a:lstStyle/>
           <a:p>
-            <a:fld id="{741BE04D-7A0D-4E13-BB29-79C27FDF7DA6}" type="datetime1">
+            <a:fld id="{EA06DEB2-D5FF-4C24-87CA-A01EB3E2D074}" type="datetime1">
               <a:rPr lang="de-DE" smtClean="0"/>
-              <a:t>14.05.2019</a:t>
+              <a:t>27.05.2019</a:t>
             </a:fld>
             <a:endParaRPr lang="de-DE"/>
           </a:p>
@@ -2908,7 +2921,7 @@
           <a:p>
             <a:r>
               <a:rPr lang="de-DE"/>
-              <a:t>Thorben Schomacker</a:t>
+              <a:t>Thorben Schomacker &amp; Ferdinand Trendelenburg</a:t>
             </a:r>
           </a:p>
         </p:txBody>
@@ -2981,9 +2994,9 @@
           <a:bodyPr/>
           <a:lstStyle/>
           <a:p>
-            <a:fld id="{F5E030E1-0E2B-44E4-BBDC-186185E9998E}" type="datetime1">
+            <a:fld id="{472F30DE-E485-446B-A2F6-919F6D087BD5}" type="datetime1">
               <a:rPr lang="de-DE" smtClean="0"/>
-              <a:t>14.05.2019</a:t>
+              <a:t>27.05.2019</a:t>
             </a:fld>
             <a:endParaRPr lang="de-DE"/>
           </a:p>
@@ -3006,7 +3019,7 @@
           <a:p>
             <a:r>
               <a:rPr lang="de-DE"/>
-              <a:t>Thorben Schomacker</a:t>
+              <a:t>Thorben Schomacker &amp; Ferdinand Trendelenburg</a:t>
             </a:r>
           </a:p>
         </p:txBody>
@@ -3305,9 +3318,9 @@
           <a:bodyPr/>
           <a:lstStyle/>
           <a:p>
-            <a:fld id="{9B905827-D58C-46E3-B028-235B82D79C7B}" type="datetime1">
+            <a:fld id="{4789DAD7-195C-47B4-9577-1FFFD133FBEE}" type="datetime1">
               <a:rPr lang="de-DE" smtClean="0"/>
-              <a:t>14.05.2019</a:t>
+              <a:t>27.05.2019</a:t>
             </a:fld>
             <a:endParaRPr lang="de-DE"/>
           </a:p>
@@ -3330,7 +3343,7 @@
           <a:p>
             <a:r>
               <a:rPr lang="de-DE"/>
-              <a:t>Thorben Schomacker</a:t>
+              <a:t>Thorben Schomacker &amp; Ferdinand Trendelenburg</a:t>
             </a:r>
           </a:p>
         </p:txBody>
@@ -3560,9 +3573,9 @@
           <a:bodyPr/>
           <a:lstStyle/>
           <a:p>
-            <a:fld id="{44F41909-6AFF-426F-87BA-33061AF506EA}" type="datetime1">
+            <a:fld id="{1E672C02-3394-418C-A330-C2248FAE5048}" type="datetime1">
               <a:rPr lang="de-DE" smtClean="0"/>
-              <a:t>14.05.2019</a:t>
+              <a:t>27.05.2019</a:t>
             </a:fld>
             <a:endParaRPr lang="de-DE"/>
           </a:p>
@@ -3585,7 +3598,7 @@
           <a:p>
             <a:r>
               <a:rPr lang="de-DE"/>
-              <a:t>Thorben Schomacker</a:t>
+              <a:t>Thorben Schomacker &amp; Ferdinand Trendelenburg</a:t>
             </a:r>
           </a:p>
         </p:txBody>
@@ -3774,9 +3787,9 @@
             </a:lvl1pPr>
           </a:lstStyle>
           <a:p>
-            <a:fld id="{3624991D-38F8-4DC3-968D-01E3525E9F44}" type="datetime1">
+            <a:fld id="{D866ED9C-5CCB-49E4-8E8B-E2F21E213F28}" type="datetime1">
               <a:rPr lang="de-DE" smtClean="0"/>
-              <a:t>14.05.2019</a:t>
+              <a:t>27.05.2019</a:t>
             </a:fld>
             <a:endParaRPr lang="de-DE"/>
           </a:p>
@@ -3814,9 +3827,10 @@
           </a:lstStyle>
           <a:p>
             <a:r>
-              <a:rPr lang="de-DE" dirty="0"/>
-              <a:t>Thorben Schomacker</a:t>
-            </a:r>
+              <a:rPr lang="de-DE"/>
+              <a:t>Thorben Schomacker &amp; Ferdinand Trendelenburg</a:t>
+            </a:r>
+            <a:endParaRPr lang="de-DE" dirty="0"/>
           </a:p>
         </p:txBody>
       </p:sp>
@@ -4229,11 +4243,41 @@
         </p:nvSpPr>
         <p:spPr/>
         <p:txBody>
-          <a:bodyPr/>
-          <a:lstStyle/>
-          <a:p>
+          <a:bodyPr>
+            <a:normAutofit fontScale="77500" lnSpcReduction="20000"/>
+          </a:bodyPr>
+          <a:lstStyle/>
+          <a:p>
+            <a:r>
+              <a:rPr lang="de-DE" dirty="0"/>
+              <a:t>Thorben Schomacker &amp; Ferdinand Trendelenburg</a:t>
+            </a:r>
+          </a:p>
+          <a:p>
+            <a:r>
+              <a:rPr lang="de-DE"/>
+              <a:t>Angewandte Informatik</a:t>
+            </a:r>
             <a:endParaRPr lang="de-DE" dirty="0"/>
           </a:p>
+          <a:p>
+            <a:r>
+              <a:rPr lang="de-DE" dirty="0"/>
+              <a:t>Datawarehouse</a:t>
+            </a:r>
+          </a:p>
+          <a:p>
+            <a:r>
+              <a:rPr lang="de-DE" dirty="0"/>
+              <a:t>Prof. Dr. Wolfgang Gerken</a:t>
+            </a:r>
+          </a:p>
+          <a:p>
+            <a:r>
+              <a:rPr lang="de-DE" dirty="0"/>
+              <a:t>Hochschule für Angewandte Wissenschaften Hamburg</a:t>
+            </a:r>
+          </a:p>
         </p:txBody>
       </p:sp>
       <p:sp>
@@ -4259,7 +4303,7 @@
           <a:p>
             <a:r>
               <a:rPr lang="de-DE" dirty="0"/>
-              <a:t>Thorben Schomacker</a:t>
+              <a:t>Thorben Schomacker &amp; Ferdinand Trendelenburg</a:t>
             </a:r>
           </a:p>
         </p:txBody>
@@ -4456,7 +4500,7 @@
           <a:p>
             <a:r>
               <a:rPr lang="de-DE" dirty="0" err="1"/>
-              <a:t>Microstrategy</a:t>
+              <a:t>MicroStrategy</a:t>
             </a:r>
             <a:endParaRPr lang="de-DE" dirty="0"/>
           </a:p>
@@ -4539,7 +4583,7 @@
           <a:p>
             <a:r>
               <a:rPr lang="de-DE"/>
-              <a:t>Thorben Schomacker</a:t>
+              <a:t>Thorben Schomacker &amp; Ferdinand Trendelenburg</a:t>
             </a:r>
           </a:p>
         </p:txBody>
@@ -4691,7 +4735,7 @@
                 <a:ea typeface="+mn-ea"/>
                 <a:cs typeface="+mn-cs"/>
               </a:rPr>
-              <a:t>Thorben Schomacker</a:t>
+              <a:t>Thorben Schomacker &amp; Ferdinand Trendelenburg</a:t>
             </a:r>
           </a:p>
         </p:txBody>
@@ -4867,7 +4911,7 @@
                 <a:ea typeface="+mn-ea"/>
                 <a:cs typeface="+mn-cs"/>
               </a:rPr>
-              <a:t>Thorben Schomacker</a:t>
+              <a:t>Thorben Schomacker &amp; Ferdinand Trendelenburg</a:t>
             </a:r>
           </a:p>
         </p:txBody>
@@ -5049,7 +5093,7 @@
           <a:p>
             <a:r>
               <a:rPr lang="de-DE"/>
-              <a:t>Thorben Schomacker</a:t>
+              <a:t>Thorben Schomacker &amp; Ferdinand Trendelenburg</a:t>
             </a:r>
           </a:p>
         </p:txBody>
@@ -5357,7 +5401,7 @@
           <a:p>
             <a:r>
               <a:rPr lang="de-DE"/>
-              <a:t>Thorben Schomacker</a:t>
+              <a:t>Thorben Schomacker &amp; Ferdinand Trendelenburg</a:t>
             </a:r>
             <a:endParaRPr lang="de-DE" dirty="0"/>
           </a:p>
@@ -5443,7 +5487,10 @@
           <a:bodyPr/>
           <a:lstStyle/>
           <a:p>
-            <a:endParaRPr lang="de-DE"/>
+            <a:r>
+              <a:rPr lang="de-DE" dirty="0"/>
+              <a:t>Preis</a:t>
+            </a:r>
           </a:p>
         </p:txBody>
       </p:sp>
@@ -5468,7 +5515,10 @@
           <a:bodyPr/>
           <a:lstStyle/>
           <a:p>
-            <a:endParaRPr lang="de-DE"/>
+            <a:r>
+              <a:rPr lang="de-DE" dirty="0"/>
+              <a:t>Tableau</a:t>
+            </a:r>
           </a:p>
         </p:txBody>
       </p:sp>
@@ -5495,9 +5545,114 @@
           <a:p>
             <a:r>
               <a:rPr lang="de-DE" dirty="0"/>
-              <a:t>Desktop 0</a:t>
-            </a:r>
-          </a:p>
+              <a:t>Creator $70 per </a:t>
+            </a:r>
+            <a:r>
+              <a:rPr lang="de-DE" dirty="0" err="1"/>
+              <a:t>user</a:t>
+            </a:r>
+            <a:r>
+              <a:rPr lang="de-DE" dirty="0"/>
+              <a:t>/</a:t>
+            </a:r>
+            <a:r>
+              <a:rPr lang="de-DE" dirty="0" err="1"/>
+              <a:t>month</a:t>
+            </a:r>
+            <a:endParaRPr lang="de-DE" dirty="0"/>
+          </a:p>
+          <a:p>
+            <a:r>
+              <a:rPr lang="de-DE" dirty="0"/>
+              <a:t>Explorer $35 per </a:t>
+            </a:r>
+            <a:r>
+              <a:rPr lang="de-DE" dirty="0" err="1"/>
+              <a:t>user</a:t>
+            </a:r>
+            <a:r>
+              <a:rPr lang="de-DE" dirty="0"/>
+              <a:t>/</a:t>
+            </a:r>
+            <a:r>
+              <a:rPr lang="de-DE" dirty="0" err="1"/>
+              <a:t>month</a:t>
+            </a:r>
+            <a:endParaRPr lang="de-DE" dirty="0"/>
+          </a:p>
+          <a:p>
+            <a:r>
+              <a:rPr lang="de-DE" dirty="0"/>
+              <a:t>Viewer 12$ per </a:t>
+            </a:r>
+            <a:r>
+              <a:rPr lang="de-DE" dirty="0" err="1"/>
+              <a:t>user</a:t>
+            </a:r>
+            <a:r>
+              <a:rPr lang="de-DE" dirty="0"/>
+              <a:t>/</a:t>
+            </a:r>
+            <a:r>
+              <a:rPr lang="de-DE" dirty="0" err="1"/>
+              <a:t>month</a:t>
+            </a:r>
+            <a:endParaRPr lang="de-DE" dirty="0"/>
+          </a:p>
+          <a:p>
+            <a:endParaRPr lang="de-DE" dirty="0"/>
+          </a:p>
+        </p:txBody>
+      </p:sp>
+      <p:sp>
+        <p:nvSpPr>
+          <p:cNvPr id="5" name="Textplatzhalter 4">
+            <a:extLst>
+              <a:ext uri="{FF2B5EF4-FFF2-40B4-BE49-F238E27FC236}">
+                <a16:creationId xmlns:a16="http://schemas.microsoft.com/office/drawing/2014/main" id="{3C1C501B-2ADE-4AB0-97E4-0B9728EC0345}"/>
+              </a:ext>
+            </a:extLst>
+          </p:cNvPr>
+          <p:cNvSpPr>
+            <a:spLocks noGrp="1"/>
+          </p:cNvSpPr>
+          <p:nvPr>
+            <p:ph type="body" sz="quarter" idx="3"/>
+          </p:nvPr>
+        </p:nvSpPr>
+        <p:spPr/>
+        <p:txBody>
+          <a:bodyPr/>
+          <a:lstStyle/>
+          <a:p>
+            <a:r>
+              <a:rPr lang="de-DE" dirty="0" err="1"/>
+              <a:t>MicroStrategy</a:t>
+            </a:r>
+            <a:endParaRPr lang="de-DE" dirty="0"/>
+          </a:p>
+        </p:txBody>
+      </p:sp>
+      <p:sp>
+        <p:nvSpPr>
+          <p:cNvPr id="6" name="Inhaltsplatzhalter 5">
+            <a:extLst>
+              <a:ext uri="{FF2B5EF4-FFF2-40B4-BE49-F238E27FC236}">
+                <a16:creationId xmlns:a16="http://schemas.microsoft.com/office/drawing/2014/main" id="{2D0EAD33-BDA6-4F1D-A1EA-3D3B7D4492B0}"/>
+              </a:ext>
+            </a:extLst>
+          </p:cNvPr>
+          <p:cNvSpPr>
+            <a:spLocks noGrp="1"/>
+          </p:cNvSpPr>
+          <p:nvPr>
+            <p:ph sz="quarter" idx="4"/>
+          </p:nvPr>
+        </p:nvSpPr>
+        <p:spPr/>
+        <p:txBody>
+          <a:bodyPr/>
+          <a:lstStyle/>
           <a:p>
             <a:r>
               <a:rPr lang="de-DE" dirty="0"/>
@@ -5520,94 +5675,9 @@
               <a:t> 5000$ per User</a:t>
             </a:r>
           </a:p>
-        </p:txBody>
-      </p:sp>
-      <p:sp>
-        <p:nvSpPr>
-          <p:cNvPr id="5" name="Textplatzhalter 4">
-            <a:extLst>
-              <a:ext uri="{FF2B5EF4-FFF2-40B4-BE49-F238E27FC236}">
-                <a16:creationId xmlns:a16="http://schemas.microsoft.com/office/drawing/2014/main" id="{3C1C501B-2ADE-4AB0-97E4-0B9728EC0345}"/>
-              </a:ext>
-            </a:extLst>
-          </p:cNvPr>
-          <p:cNvSpPr>
-            <a:spLocks noGrp="1"/>
-          </p:cNvSpPr>
-          <p:nvPr>
-            <p:ph type="body" sz="quarter" idx="3"/>
-          </p:nvPr>
-        </p:nvSpPr>
-        <p:spPr/>
-        <p:txBody>
-          <a:bodyPr/>
-          <a:lstStyle/>
-          <a:p>
-            <a:endParaRPr lang="de-DE"/>
-          </a:p>
-        </p:txBody>
-      </p:sp>
-      <p:sp>
-        <p:nvSpPr>
-          <p:cNvPr id="6" name="Inhaltsplatzhalter 5">
-            <a:extLst>
-              <a:ext uri="{FF2B5EF4-FFF2-40B4-BE49-F238E27FC236}">
-                <a16:creationId xmlns:a16="http://schemas.microsoft.com/office/drawing/2014/main" id="{2D0EAD33-BDA6-4F1D-A1EA-3D3B7D4492B0}"/>
-              </a:ext>
-            </a:extLst>
-          </p:cNvPr>
-          <p:cNvSpPr>
-            <a:spLocks noGrp="1"/>
-          </p:cNvSpPr>
-          <p:nvPr>
-            <p:ph sz="quarter" idx="4"/>
-          </p:nvPr>
-        </p:nvSpPr>
-        <p:spPr/>
-        <p:txBody>
-          <a:bodyPr/>
-          <a:lstStyle/>
-          <a:p>
-            <a:r>
-              <a:rPr lang="de-DE" dirty="0"/>
-              <a:t>Creator $70 per </a:t>
-            </a:r>
-            <a:r>
-              <a:rPr lang="de-DE" dirty="0" err="1"/>
-              <a:t>user</a:t>
-            </a:r>
-            <a:r>
-              <a:rPr lang="de-DE" dirty="0"/>
-              <a:t>/</a:t>
-            </a:r>
-            <a:r>
-              <a:rPr lang="de-DE" dirty="0" err="1"/>
-              <a:t>month</a:t>
-            </a:r>
+          <a:p>
             <a:endParaRPr lang="de-DE" dirty="0"/>
           </a:p>
-          <a:p>
-            <a:r>
-              <a:rPr lang="de-DE" dirty="0"/>
-              <a:t>Viewer 12$ per </a:t>
-            </a:r>
-            <a:r>
-              <a:rPr lang="de-DE" dirty="0" err="1"/>
-              <a:t>user</a:t>
-            </a:r>
-            <a:r>
-              <a:rPr lang="de-DE" dirty="0"/>
-              <a:t>/</a:t>
-            </a:r>
-            <a:r>
-              <a:rPr lang="de-DE" dirty="0" err="1"/>
-              <a:t>month</a:t>
-            </a:r>
-            <a:endParaRPr lang="de-DE" dirty="0"/>
-          </a:p>
-          <a:p>
-            <a:endParaRPr lang="de-DE" dirty="0"/>
-          </a:p>
         </p:txBody>
       </p:sp>
       <p:sp>
@@ -5633,7 +5703,7 @@
           <a:p>
             <a:r>
               <a:rPr lang="de-DE"/>
-              <a:t>Thorben Schomacker</a:t>
+              <a:t>Thorben Schomacker &amp; Ferdinand Trendelenburg</a:t>
             </a:r>
           </a:p>
         </p:txBody>
@@ -5791,7 +5861,7 @@
           <a:p>
             <a:r>
               <a:rPr lang="de-DE"/>
-              <a:t>Thorben Schomacker</a:t>
+              <a:t>Thorben Schomacker &amp; Ferdinand Trendelenburg</a:t>
             </a:r>
           </a:p>
         </p:txBody>
@@ -5997,6 +6067,716 @@
     <p:extLst>
       <p:ext uri="{BB962C8B-B14F-4D97-AF65-F5344CB8AC3E}">
         <p14:creationId xmlns:p14="http://schemas.microsoft.com/office/powerpoint/2010/main" val="786592950"/>
+      </p:ext>
+    </p:extLst>
+  </p:cSld>
+  <p:clrMapOvr>
+    <a:masterClrMapping/>
+  </p:clrMapOvr>
+</p:sld>
+</file>
+
+<file path=ppt/slides/slide17.xml><?xml version="1.0" encoding="utf-8"?>
+<p:sld xmlns:a="http://schemas.openxmlformats.org/drawingml/2006/main" xmlns:r="http://schemas.openxmlformats.org/officeDocument/2006/relationships" xmlns:p="http://schemas.openxmlformats.org/presentationml/2006/main">
+  <p:cSld>
+    <p:spTree>
+      <p:nvGrpSpPr>
+        <p:cNvPr id="1" name=""/>
+        <p:cNvGrpSpPr/>
+        <p:nvPr/>
+      </p:nvGrpSpPr>
+      <p:grpSpPr>
+        <a:xfrm>
+          <a:off x="0" y="0"/>
+          <a:ext cx="0" cy="0"/>
+          <a:chOff x="0" y="0"/>
+          <a:chExt cx="0" cy="0"/>
+        </a:xfrm>
+      </p:grpSpPr>
+      <p:sp>
+        <p:nvSpPr>
+          <p:cNvPr id="2" name="Titel 1">
+            <a:extLst>
+              <a:ext uri="{FF2B5EF4-FFF2-40B4-BE49-F238E27FC236}">
+                <a16:creationId xmlns:a16="http://schemas.microsoft.com/office/drawing/2014/main" id="{10170B52-4088-4336-92A2-9EBBC266E5AC}"/>
+              </a:ext>
+            </a:extLst>
+          </p:cNvPr>
+          <p:cNvSpPr>
+            <a:spLocks noGrp="1"/>
+          </p:cNvSpPr>
+          <p:nvPr>
+            <p:ph type="title"/>
+          </p:nvPr>
+        </p:nvSpPr>
+        <p:spPr/>
+        <p:txBody>
+          <a:bodyPr/>
+          <a:lstStyle/>
+          <a:p>
+            <a:r>
+              <a:rPr lang="de-DE" dirty="0"/>
+              <a:t>Runde 4: Support</a:t>
+            </a:r>
+          </a:p>
+        </p:txBody>
+      </p:sp>
+      <p:sp>
+        <p:nvSpPr>
+          <p:cNvPr id="3" name="Textplatzhalter 2">
+            <a:extLst>
+              <a:ext uri="{FF2B5EF4-FFF2-40B4-BE49-F238E27FC236}">
+                <a16:creationId xmlns:a16="http://schemas.microsoft.com/office/drawing/2014/main" id="{8A03BB39-1F7C-4F43-9FA7-257060B076A6}"/>
+              </a:ext>
+            </a:extLst>
+          </p:cNvPr>
+          <p:cNvSpPr>
+            <a:spLocks noGrp="1"/>
+          </p:cNvSpPr>
+          <p:nvPr>
+            <p:ph type="body" idx="1"/>
+          </p:nvPr>
+        </p:nvSpPr>
+        <p:spPr/>
+        <p:txBody>
+          <a:bodyPr/>
+          <a:lstStyle/>
+          <a:p>
+            <a:endParaRPr lang="de-DE"/>
+          </a:p>
+        </p:txBody>
+      </p:sp>
+      <p:sp>
+        <p:nvSpPr>
+          <p:cNvPr id="4" name="Fußzeilenplatzhalter 3">
+            <a:extLst>
+              <a:ext uri="{FF2B5EF4-FFF2-40B4-BE49-F238E27FC236}">
+                <a16:creationId xmlns:a16="http://schemas.microsoft.com/office/drawing/2014/main" id="{FCB84CA1-4CDA-4243-B812-17A0EDF01838}"/>
+              </a:ext>
+            </a:extLst>
+          </p:cNvPr>
+          <p:cNvSpPr>
+            <a:spLocks noGrp="1"/>
+          </p:cNvSpPr>
+          <p:nvPr>
+            <p:ph type="ftr" sz="quarter" idx="11"/>
+          </p:nvPr>
+        </p:nvSpPr>
+        <p:spPr/>
+        <p:txBody>
+          <a:bodyPr/>
+          <a:lstStyle/>
+          <a:p>
+            <a:r>
+              <a:rPr lang="de-DE"/>
+              <a:t>Thorben Schomacker &amp; Ferdinand Trendelenburg</a:t>
+            </a:r>
+            <a:endParaRPr lang="de-DE" dirty="0"/>
+          </a:p>
+        </p:txBody>
+      </p:sp>
+      <p:sp>
+        <p:nvSpPr>
+          <p:cNvPr id="5" name="Foliennummernplatzhalter 4">
+            <a:extLst>
+              <a:ext uri="{FF2B5EF4-FFF2-40B4-BE49-F238E27FC236}">
+                <a16:creationId xmlns:a16="http://schemas.microsoft.com/office/drawing/2014/main" id="{A2AC6686-15B6-4DE7-92BF-2B5AF931CC86}"/>
+              </a:ext>
+            </a:extLst>
+          </p:cNvPr>
+          <p:cNvSpPr>
+            <a:spLocks noGrp="1"/>
+          </p:cNvSpPr>
+          <p:nvPr>
+            <p:ph type="sldNum" sz="quarter" idx="12"/>
+          </p:nvPr>
+        </p:nvSpPr>
+        <p:spPr/>
+        <p:txBody>
+          <a:bodyPr/>
+          <a:lstStyle/>
+          <a:p>
+            <a:fld id="{211E1A2D-EDD7-41B5-B3C6-ADA4DCBFAA23}" type="slidenum">
+              <a:rPr lang="de-DE" smtClean="0"/>
+              <a:t>17</a:t>
+            </a:fld>
+            <a:endParaRPr lang="de-DE"/>
+          </a:p>
+        </p:txBody>
+      </p:sp>
+    </p:spTree>
+    <p:extLst>
+      <p:ext uri="{BB962C8B-B14F-4D97-AF65-F5344CB8AC3E}">
+        <p14:creationId xmlns:p14="http://schemas.microsoft.com/office/powerpoint/2010/main" val="1074384006"/>
+      </p:ext>
+    </p:extLst>
+  </p:cSld>
+  <p:clrMapOvr>
+    <a:masterClrMapping/>
+  </p:clrMapOvr>
+</p:sld>
+</file>
+
+<file path=ppt/slides/slide18.xml><?xml version="1.0" encoding="utf-8"?>
+<p:sld xmlns:a="http://schemas.openxmlformats.org/drawingml/2006/main" xmlns:r="http://schemas.openxmlformats.org/officeDocument/2006/relationships" xmlns:p="http://schemas.openxmlformats.org/presentationml/2006/main">
+  <p:cSld>
+    <p:spTree>
+      <p:nvGrpSpPr>
+        <p:cNvPr id="1" name=""/>
+        <p:cNvGrpSpPr/>
+        <p:nvPr/>
+      </p:nvGrpSpPr>
+      <p:grpSpPr>
+        <a:xfrm>
+          <a:off x="0" y="0"/>
+          <a:ext cx="0" cy="0"/>
+          <a:chOff x="0" y="0"/>
+          <a:chExt cx="0" cy="0"/>
+        </a:xfrm>
+      </p:grpSpPr>
+      <p:sp>
+        <p:nvSpPr>
+          <p:cNvPr id="2" name="Titel 1">
+            <a:extLst>
+              <a:ext uri="{FF2B5EF4-FFF2-40B4-BE49-F238E27FC236}">
+                <a16:creationId xmlns:a16="http://schemas.microsoft.com/office/drawing/2014/main" id="{9D59B21B-8836-4A6A-83B0-E7CDAB88459B}"/>
+              </a:ext>
+            </a:extLst>
+          </p:cNvPr>
+          <p:cNvSpPr>
+            <a:spLocks noGrp="1"/>
+          </p:cNvSpPr>
+          <p:nvPr>
+            <p:ph type="title"/>
+          </p:nvPr>
+        </p:nvSpPr>
+        <p:spPr/>
+        <p:txBody>
+          <a:bodyPr/>
+          <a:lstStyle/>
+          <a:p>
+            <a:r>
+              <a:rPr lang="de-DE" dirty="0"/>
+              <a:t>Support</a:t>
+            </a:r>
+          </a:p>
+        </p:txBody>
+      </p:sp>
+      <p:sp>
+        <p:nvSpPr>
+          <p:cNvPr id="3" name="Textplatzhalter 2">
+            <a:extLst>
+              <a:ext uri="{FF2B5EF4-FFF2-40B4-BE49-F238E27FC236}">
+                <a16:creationId xmlns:a16="http://schemas.microsoft.com/office/drawing/2014/main" id="{F6F78157-150D-4D7A-BF01-961B3051F95A}"/>
+              </a:ext>
+            </a:extLst>
+          </p:cNvPr>
+          <p:cNvSpPr>
+            <a:spLocks noGrp="1"/>
+          </p:cNvSpPr>
+          <p:nvPr>
+            <p:ph type="body" idx="1"/>
+          </p:nvPr>
+        </p:nvSpPr>
+        <p:spPr/>
+        <p:txBody>
+          <a:bodyPr/>
+          <a:lstStyle/>
+          <a:p>
+            <a:r>
+              <a:rPr lang="de-DE" dirty="0"/>
+              <a:t>Tableau</a:t>
+            </a:r>
+          </a:p>
+        </p:txBody>
+      </p:sp>
+      <p:sp>
+        <p:nvSpPr>
+          <p:cNvPr id="4" name="Inhaltsplatzhalter 3">
+            <a:extLst>
+              <a:ext uri="{FF2B5EF4-FFF2-40B4-BE49-F238E27FC236}">
+                <a16:creationId xmlns:a16="http://schemas.microsoft.com/office/drawing/2014/main" id="{4DCFF580-D458-4D32-8274-3550CAFB1F82}"/>
+              </a:ext>
+            </a:extLst>
+          </p:cNvPr>
+          <p:cNvSpPr>
+            <a:spLocks noGrp="1"/>
+          </p:cNvSpPr>
+          <p:nvPr>
+            <p:ph sz="half" idx="2"/>
+          </p:nvPr>
+        </p:nvSpPr>
+        <p:spPr/>
+        <p:txBody>
+          <a:bodyPr/>
+          <a:lstStyle/>
+          <a:p>
+            <a:r>
+              <a:rPr lang="de-DE" dirty="0"/>
+              <a:t>Deutschsprach. Telefonsupport</a:t>
+            </a:r>
+          </a:p>
+          <a:p>
+            <a:r>
+              <a:rPr lang="de-DE" dirty="0"/>
+              <a:t>Deutschsprach. Anleitungsvideos</a:t>
+            </a:r>
+          </a:p>
+          <a:p>
+            <a:endParaRPr lang="de-DE" dirty="0"/>
+          </a:p>
+        </p:txBody>
+      </p:sp>
+      <p:sp>
+        <p:nvSpPr>
+          <p:cNvPr id="5" name="Textplatzhalter 4">
+            <a:extLst>
+              <a:ext uri="{FF2B5EF4-FFF2-40B4-BE49-F238E27FC236}">
+                <a16:creationId xmlns:a16="http://schemas.microsoft.com/office/drawing/2014/main" id="{3C1C501B-2ADE-4AB0-97E4-0B9728EC0345}"/>
+              </a:ext>
+            </a:extLst>
+          </p:cNvPr>
+          <p:cNvSpPr>
+            <a:spLocks noGrp="1"/>
+          </p:cNvSpPr>
+          <p:nvPr>
+            <p:ph type="body" sz="quarter" idx="3"/>
+          </p:nvPr>
+        </p:nvSpPr>
+        <p:spPr/>
+        <p:txBody>
+          <a:bodyPr/>
+          <a:lstStyle/>
+          <a:p>
+            <a:r>
+              <a:rPr lang="de-DE" dirty="0" err="1"/>
+              <a:t>MicroStrategy</a:t>
+            </a:r>
+            <a:endParaRPr lang="de-DE" dirty="0"/>
+          </a:p>
+        </p:txBody>
+      </p:sp>
+      <p:sp>
+        <p:nvSpPr>
+          <p:cNvPr id="6" name="Inhaltsplatzhalter 5">
+            <a:extLst>
+              <a:ext uri="{FF2B5EF4-FFF2-40B4-BE49-F238E27FC236}">
+                <a16:creationId xmlns:a16="http://schemas.microsoft.com/office/drawing/2014/main" id="{2D0EAD33-BDA6-4F1D-A1EA-3D3B7D4492B0}"/>
+              </a:ext>
+            </a:extLst>
+          </p:cNvPr>
+          <p:cNvSpPr>
+            <a:spLocks noGrp="1"/>
+          </p:cNvSpPr>
+          <p:nvPr>
+            <p:ph sz="quarter" idx="4"/>
+          </p:nvPr>
+        </p:nvSpPr>
+        <p:spPr/>
+        <p:txBody>
+          <a:bodyPr/>
+          <a:lstStyle/>
+          <a:p>
+            <a:r>
+              <a:rPr lang="de-DE" dirty="0"/>
+              <a:t>Deutschsprach. Telefonsupport</a:t>
+            </a:r>
+          </a:p>
+          <a:p>
+            <a:r>
+              <a:rPr lang="de-DE" dirty="0"/>
+              <a:t>Deutschsprach. Anleitungsvideos</a:t>
+            </a:r>
+          </a:p>
+        </p:txBody>
+      </p:sp>
+      <p:sp>
+        <p:nvSpPr>
+          <p:cNvPr id="7" name="Fußzeilenplatzhalter 6">
+            <a:extLst>
+              <a:ext uri="{FF2B5EF4-FFF2-40B4-BE49-F238E27FC236}">
+                <a16:creationId xmlns:a16="http://schemas.microsoft.com/office/drawing/2014/main" id="{C5B21B61-A463-4115-8453-43BCBBC18393}"/>
+              </a:ext>
+            </a:extLst>
+          </p:cNvPr>
+          <p:cNvSpPr>
+            <a:spLocks noGrp="1"/>
+          </p:cNvSpPr>
+          <p:nvPr>
+            <p:ph type="ftr" sz="quarter" idx="11"/>
+          </p:nvPr>
+        </p:nvSpPr>
+        <p:spPr/>
+        <p:txBody>
+          <a:bodyPr/>
+          <a:lstStyle/>
+          <a:p>
+            <a:r>
+              <a:rPr lang="de-DE"/>
+              <a:t>Thorben Schomacker &amp; Ferdinand Trendelenburg</a:t>
+            </a:r>
+          </a:p>
+        </p:txBody>
+      </p:sp>
+      <p:sp>
+        <p:nvSpPr>
+          <p:cNvPr id="8" name="Foliennummernplatzhalter 7">
+            <a:extLst>
+              <a:ext uri="{FF2B5EF4-FFF2-40B4-BE49-F238E27FC236}">
+                <a16:creationId xmlns:a16="http://schemas.microsoft.com/office/drawing/2014/main" id="{0C4DFDF5-20F3-4873-A148-159D72E322FC}"/>
+              </a:ext>
+            </a:extLst>
+          </p:cNvPr>
+          <p:cNvSpPr>
+            <a:spLocks noGrp="1"/>
+          </p:cNvSpPr>
+          <p:nvPr>
+            <p:ph type="sldNum" sz="quarter" idx="12"/>
+          </p:nvPr>
+        </p:nvSpPr>
+        <p:spPr/>
+        <p:txBody>
+          <a:bodyPr/>
+          <a:lstStyle/>
+          <a:p>
+            <a:fld id="{211E1A2D-EDD7-41B5-B3C6-ADA4DCBFAA23}" type="slidenum">
+              <a:rPr lang="de-DE" smtClean="0"/>
+              <a:pPr/>
+              <a:t>18</a:t>
+            </a:fld>
+            <a:endParaRPr lang="de-DE"/>
+          </a:p>
+        </p:txBody>
+      </p:sp>
+    </p:spTree>
+    <p:extLst>
+      <p:ext uri="{BB962C8B-B14F-4D97-AF65-F5344CB8AC3E}">
+        <p14:creationId xmlns:p14="http://schemas.microsoft.com/office/powerpoint/2010/main" val="228153460"/>
+      </p:ext>
+    </p:extLst>
+  </p:cSld>
+  <p:clrMapOvr>
+    <a:masterClrMapping/>
+  </p:clrMapOvr>
+</p:sld>
+</file>
+
+<file path=ppt/slides/slide19.xml><?xml version="1.0" encoding="utf-8"?>
+<p:sld xmlns:a="http://schemas.openxmlformats.org/drawingml/2006/main" xmlns:r="http://schemas.openxmlformats.org/officeDocument/2006/relationships" xmlns:p="http://schemas.openxmlformats.org/presentationml/2006/main">
+  <p:cSld>
+    <p:spTree>
+      <p:nvGrpSpPr>
+        <p:cNvPr id="1" name=""/>
+        <p:cNvGrpSpPr/>
+        <p:nvPr/>
+      </p:nvGrpSpPr>
+      <p:grpSpPr>
+        <a:xfrm>
+          <a:off x="0" y="0"/>
+          <a:ext cx="0" cy="0"/>
+          <a:chOff x="0" y="0"/>
+          <a:chExt cx="0" cy="0"/>
+        </a:xfrm>
+      </p:grpSpPr>
+      <p:pic>
+        <p:nvPicPr>
+          <p:cNvPr id="8" name="Inhaltsplatzhalter 7" descr="Ein Bild, das Objekt enthält.&#10;&#10;Automatisch generierte Beschreibung">
+            <a:extLst>
+              <a:ext uri="{FF2B5EF4-FFF2-40B4-BE49-F238E27FC236}">
+                <a16:creationId xmlns:a16="http://schemas.microsoft.com/office/drawing/2014/main" id="{9B29D1D3-D864-4E9D-9304-71545F81C8FC}"/>
+              </a:ext>
+            </a:extLst>
+          </p:cNvPr>
+          <p:cNvPicPr>
+            <a:picLocks noGrp="1" noChangeAspect="1"/>
+          </p:cNvPicPr>
+          <p:nvPr>
+            <p:ph sz="half" idx="1"/>
+          </p:nvPr>
+        </p:nvPicPr>
+        <p:blipFill>
+          <a:blip r:embed="rId2" cstate="print">
+            <a:extLst>
+              <a:ext uri="{28A0092B-C50C-407E-A947-70E740481C1C}">
+                <a14:useLocalDpi xmlns:a14="http://schemas.microsoft.com/office/drawing/2010/main" val="0"/>
+              </a:ext>
+            </a:extLst>
+          </a:blip>
+          <a:stretch>
+            <a:fillRect/>
+          </a:stretch>
+        </p:blipFill>
+        <p:spPr>
+          <a:xfrm>
+            <a:off x="838200" y="2219621"/>
+            <a:ext cx="5181600" cy="3563346"/>
+          </a:xfrm>
+        </p:spPr>
+      </p:pic>
+      <p:pic>
+        <p:nvPicPr>
+          <p:cNvPr id="13" name="Inhaltsplatzhalter 12">
+            <a:extLst>
+              <a:ext uri="{FF2B5EF4-FFF2-40B4-BE49-F238E27FC236}">
+                <a16:creationId xmlns:a16="http://schemas.microsoft.com/office/drawing/2014/main" id="{3CAF4226-8DDA-442D-9E78-C2C73F4CB818}"/>
+              </a:ext>
+            </a:extLst>
+          </p:cNvPr>
+          <p:cNvPicPr>
+            <a:picLocks noGrp="1" noChangeAspect="1"/>
+          </p:cNvPicPr>
+          <p:nvPr>
+            <p:ph sz="half" idx="2"/>
+          </p:nvPr>
+        </p:nvPicPr>
+        <p:blipFill>
+          <a:blip r:embed="rId3">
+            <a:extLst>
+              <a:ext uri="{28A0092B-C50C-407E-A947-70E740481C1C}">
+                <a14:useLocalDpi xmlns:a14="http://schemas.microsoft.com/office/drawing/2010/main" val="0"/>
+              </a:ext>
+            </a:extLst>
+          </a:blip>
+          <a:stretch>
+            <a:fillRect/>
+          </a:stretch>
+        </p:blipFill>
+        <p:spPr>
+          <a:xfrm>
+            <a:off x="6587331" y="1825625"/>
+            <a:ext cx="4351338" cy="4351338"/>
+          </a:xfrm>
+        </p:spPr>
+      </p:pic>
+      <p:sp>
+        <p:nvSpPr>
+          <p:cNvPr id="4" name="Fußzeilenplatzhalter 3">
+            <a:extLst>
+              <a:ext uri="{FF2B5EF4-FFF2-40B4-BE49-F238E27FC236}">
+                <a16:creationId xmlns:a16="http://schemas.microsoft.com/office/drawing/2014/main" id="{647F42DC-AE05-463C-9BFA-FA50B8164724}"/>
+              </a:ext>
+            </a:extLst>
+          </p:cNvPr>
+          <p:cNvSpPr>
+            <a:spLocks noGrp="1"/>
+          </p:cNvSpPr>
+          <p:nvPr>
+            <p:ph type="ftr" sz="quarter" idx="11"/>
+          </p:nvPr>
+        </p:nvSpPr>
+        <p:spPr/>
+        <p:txBody>
+          <a:bodyPr/>
+          <a:lstStyle/>
+          <a:p>
+            <a:r>
+              <a:rPr lang="de-DE"/>
+              <a:t>Thorben Schomacker &amp; Ferdinand Trendelenburg</a:t>
+            </a:r>
+          </a:p>
+        </p:txBody>
+      </p:sp>
+      <p:sp>
+        <p:nvSpPr>
+          <p:cNvPr id="5" name="Foliennummernplatzhalter 4">
+            <a:extLst>
+              <a:ext uri="{FF2B5EF4-FFF2-40B4-BE49-F238E27FC236}">
+                <a16:creationId xmlns:a16="http://schemas.microsoft.com/office/drawing/2014/main" id="{746500C1-46E9-4DA2-9E11-7626E8B3A0CB}"/>
+              </a:ext>
+            </a:extLst>
+          </p:cNvPr>
+          <p:cNvSpPr>
+            <a:spLocks noGrp="1"/>
+          </p:cNvSpPr>
+          <p:nvPr>
+            <p:ph type="sldNum" sz="quarter" idx="12"/>
+          </p:nvPr>
+        </p:nvSpPr>
+        <p:spPr/>
+        <p:txBody>
+          <a:bodyPr/>
+          <a:lstStyle/>
+          <a:p>
+            <a:fld id="{211E1A2D-EDD7-41B5-B3C6-ADA4DCBFAA23}" type="slidenum">
+              <a:rPr lang="de-DE" smtClean="0"/>
+              <a:t>19</a:t>
+            </a:fld>
+            <a:endParaRPr lang="de-DE"/>
+          </a:p>
+        </p:txBody>
+      </p:sp>
+      <p:sp>
+        <p:nvSpPr>
+          <p:cNvPr id="6" name="Titel 5">
+            <a:extLst>
+              <a:ext uri="{FF2B5EF4-FFF2-40B4-BE49-F238E27FC236}">
+                <a16:creationId xmlns:a16="http://schemas.microsoft.com/office/drawing/2014/main" id="{C88EED91-7CDA-487F-8132-709512156B90}"/>
+              </a:ext>
+            </a:extLst>
+          </p:cNvPr>
+          <p:cNvSpPr>
+            <a:spLocks noGrp="1"/>
+          </p:cNvSpPr>
+          <p:nvPr>
+            <p:ph type="title"/>
+          </p:nvPr>
+        </p:nvSpPr>
+        <p:spPr/>
+        <p:txBody>
+          <a:bodyPr/>
+          <a:lstStyle/>
+          <a:p>
+            <a:r>
+              <a:rPr lang="de-DE" dirty="0"/>
+              <a:t>Der Vergleich</a:t>
+            </a:r>
+          </a:p>
+        </p:txBody>
+      </p:sp>
+      <p:sp>
+        <p:nvSpPr>
+          <p:cNvPr id="9" name="Textfeld 8">
+            <a:extLst>
+              <a:ext uri="{FF2B5EF4-FFF2-40B4-BE49-F238E27FC236}">
+                <a16:creationId xmlns:a16="http://schemas.microsoft.com/office/drawing/2014/main" id="{26C8C4A0-50B8-46B0-BC46-C6FF2FA2A181}"/>
+              </a:ext>
+            </a:extLst>
+          </p:cNvPr>
+          <p:cNvSpPr txBox="1"/>
+          <p:nvPr/>
+        </p:nvSpPr>
+        <p:spPr>
+          <a:xfrm flipH="1">
+            <a:off x="838200" y="5866547"/>
+            <a:ext cx="5181600" cy="400110"/>
+          </a:xfrm>
+          <a:prstGeom prst="rect">
+            <a:avLst/>
+          </a:prstGeom>
+          <a:noFill/>
+        </p:spPr>
+        <p:txBody>
+          <a:bodyPr wrap="square" rtlCol="0">
+            <a:spAutoFit/>
+          </a:bodyPr>
+          <a:lstStyle/>
+          <a:p>
+            <a:r>
+              <a:rPr lang="de-DE" sz="1000" dirty="0"/>
+              <a:t>http://www.lib.washington.edu/dataservices/images/Tableau_Software_logo.png/image_view_fullscreen</a:t>
+            </a:r>
+          </a:p>
+        </p:txBody>
+      </p:sp>
+      <p:sp>
+        <p:nvSpPr>
+          <p:cNvPr id="14" name="Textfeld 13">
+            <a:extLst>
+              <a:ext uri="{FF2B5EF4-FFF2-40B4-BE49-F238E27FC236}">
+                <a16:creationId xmlns:a16="http://schemas.microsoft.com/office/drawing/2014/main" id="{B4D8491D-7391-433B-B3A3-E8DD3D53FAD0}"/>
+              </a:ext>
+            </a:extLst>
+          </p:cNvPr>
+          <p:cNvSpPr txBox="1"/>
+          <p:nvPr/>
+        </p:nvSpPr>
+        <p:spPr>
+          <a:xfrm flipH="1">
+            <a:off x="6172202" y="5712659"/>
+            <a:ext cx="5181600" cy="553998"/>
+          </a:xfrm>
+          <a:prstGeom prst="rect">
+            <a:avLst/>
+          </a:prstGeom>
+          <a:noFill/>
+        </p:spPr>
+        <p:txBody>
+          <a:bodyPr wrap="square" rtlCol="0">
+            <a:spAutoFit/>
+          </a:bodyPr>
+          <a:lstStyle/>
+          <a:p>
+            <a:r>
+              <a:rPr lang="de-DE" sz="1000" dirty="0"/>
+              <a:t>https://is1-ssl.mzstatic.com/image/thumb/Purple118/v4/d4/39/0e/d4390eda-8301-11dd-14f5-01620b055552/iPadAppIcon-1x_U007emarketing-0-0-GLES2_U002c0-512MB-sRGB-0-0-0-85-220-0-0-0-5.png/1200x630bb.jpg</a:t>
+            </a:r>
+          </a:p>
+        </p:txBody>
+      </p:sp>
+      <p:sp>
+        <p:nvSpPr>
+          <p:cNvPr id="2" name="Textfeld 1">
+            <a:extLst>
+              <a:ext uri="{FF2B5EF4-FFF2-40B4-BE49-F238E27FC236}">
+                <a16:creationId xmlns:a16="http://schemas.microsoft.com/office/drawing/2014/main" id="{02A70397-77D9-4CCF-B381-ED23888FEF39}"/>
+              </a:ext>
+            </a:extLst>
+          </p:cNvPr>
+          <p:cNvSpPr txBox="1"/>
+          <p:nvPr/>
+        </p:nvSpPr>
+        <p:spPr>
+          <a:xfrm>
+            <a:off x="2990295" y="1206709"/>
+            <a:ext cx="877410" cy="1569660"/>
+          </a:xfrm>
+          <a:prstGeom prst="rect">
+            <a:avLst/>
+          </a:prstGeom>
+          <a:noFill/>
+        </p:spPr>
+        <p:txBody>
+          <a:bodyPr wrap="square" rtlCol="0">
+            <a:spAutoFit/>
+          </a:bodyPr>
+          <a:lstStyle/>
+          <a:p>
+            <a:r>
+              <a:rPr lang="de-DE" sz="9600" dirty="0"/>
+              <a:t>3</a:t>
+            </a:r>
+          </a:p>
+        </p:txBody>
+      </p:sp>
+      <p:sp>
+        <p:nvSpPr>
+          <p:cNvPr id="12" name="Textfeld 11">
+            <a:extLst>
+              <a:ext uri="{FF2B5EF4-FFF2-40B4-BE49-F238E27FC236}">
+                <a16:creationId xmlns:a16="http://schemas.microsoft.com/office/drawing/2014/main" id="{3112B90C-4797-4D90-A47A-0FD0BD074CDF}"/>
+              </a:ext>
+            </a:extLst>
+          </p:cNvPr>
+          <p:cNvSpPr txBox="1"/>
+          <p:nvPr/>
+        </p:nvSpPr>
+        <p:spPr>
+          <a:xfrm>
+            <a:off x="8324295" y="1206709"/>
+            <a:ext cx="877410" cy="1569660"/>
+          </a:xfrm>
+          <a:prstGeom prst="rect">
+            <a:avLst/>
+          </a:prstGeom>
+          <a:noFill/>
+        </p:spPr>
+        <p:txBody>
+          <a:bodyPr wrap="square" rtlCol="0">
+            <a:spAutoFit/>
+          </a:bodyPr>
+          <a:lstStyle/>
+          <a:p>
+            <a:r>
+              <a:rPr lang="de-DE" sz="9600" dirty="0"/>
+              <a:t>3</a:t>
+            </a:r>
+          </a:p>
+        </p:txBody>
+      </p:sp>
+    </p:spTree>
+    <p:extLst>
+      <p:ext uri="{BB962C8B-B14F-4D97-AF65-F5344CB8AC3E}">
+        <p14:creationId xmlns:p14="http://schemas.microsoft.com/office/powerpoint/2010/main" val="2686972417"/>
       </p:ext>
     </p:extLst>
   </p:cSld>
@@ -6078,7 +6858,7 @@
             </a:pPr>
             <a:r>
               <a:rPr lang="de-DE" dirty="0"/>
-              <a:t>Kompatibel mit vorhandenen Datenquellen</a:t>
+              <a:t>Vorhandene Features</a:t>
             </a:r>
           </a:p>
           <a:p>
@@ -6088,7 +6868,7 @@
             </a:pPr>
             <a:r>
               <a:rPr lang="de-DE" dirty="0"/>
-              <a:t>Diagramme anbieten, die Kundenanforderungen entsprechen</a:t>
+              <a:t>Generelle Handhabung</a:t>
             </a:r>
           </a:p>
           <a:p>
@@ -6098,7 +6878,7 @@
             </a:pPr>
             <a:r>
               <a:rPr lang="de-DE" dirty="0"/>
-              <a:t>Interaktive Dashboards</a:t>
+              <a:t>Preis</a:t>
             </a:r>
           </a:p>
           <a:p>
@@ -6108,7 +6888,7 @@
             </a:pPr>
             <a:r>
               <a:rPr lang="de-DE" dirty="0"/>
-              <a:t>Unterstützung der Anwenderplattform z. B. Mobile Endgeräte</a:t>
+              <a:t>Support</a:t>
             </a:r>
           </a:p>
           <a:p>
@@ -6118,8 +6898,39 @@
             </a:pPr>
             <a:r>
               <a:rPr lang="de-DE" dirty="0"/>
-              <a:t>Einfache Nutzung und Erstellung von Dashboards</a:t>
-            </a:r>
+              <a:t>Verbreitung</a:t>
+            </a:r>
+          </a:p>
+          <a:p>
+            <a:pPr marL="514350" indent="-514350">
+              <a:buFont typeface="+mj-lt"/>
+              <a:buAutoNum type="arabicPeriod"/>
+            </a:pPr>
+            <a:r>
+              <a:rPr lang="de-DE" dirty="0"/>
+              <a:t>Persönlicher Eindruck der Anwender</a:t>
+            </a:r>
+          </a:p>
+          <a:p>
+            <a:pPr marL="514350" indent="-514350">
+              <a:buFont typeface="+mj-lt"/>
+              <a:buAutoNum type="arabicPeriod"/>
+            </a:pPr>
+            <a:endParaRPr lang="de-DE" dirty="0"/>
+          </a:p>
+          <a:p>
+            <a:pPr marL="514350" indent="-514350">
+              <a:buFont typeface="+mj-lt"/>
+              <a:buAutoNum type="arabicPeriod"/>
+            </a:pPr>
+            <a:endParaRPr lang="de-DE" dirty="0"/>
+          </a:p>
+          <a:p>
+            <a:pPr marL="514350" indent="-514350">
+              <a:buFont typeface="+mj-lt"/>
+              <a:buAutoNum type="arabicPeriod"/>
+            </a:pPr>
+            <a:endParaRPr lang="de-DE" dirty="0"/>
           </a:p>
         </p:txBody>
       </p:sp>
@@ -6146,7 +6957,7 @@
           <a:p>
             <a:r>
               <a:rPr lang="de-DE"/>
-              <a:t>Thorben Schomacker</a:t>
+              <a:t>Thorben Schomacker &amp; Ferdinand Trendelenburg</a:t>
             </a:r>
             <a:endParaRPr lang="de-DE" dirty="0"/>
           </a:p>
@@ -6185,6 +6996,1476 @@
     <p:extLst>
       <p:ext uri="{BB962C8B-B14F-4D97-AF65-F5344CB8AC3E}">
         <p14:creationId xmlns:p14="http://schemas.microsoft.com/office/powerpoint/2010/main" val="2518176920"/>
+      </p:ext>
+    </p:extLst>
+  </p:cSld>
+  <p:clrMapOvr>
+    <a:masterClrMapping/>
+  </p:clrMapOvr>
+</p:sld>
+</file>
+
+<file path=ppt/slides/slide20.xml><?xml version="1.0" encoding="utf-8"?>
+<p:sld xmlns:a="http://schemas.openxmlformats.org/drawingml/2006/main" xmlns:r="http://schemas.openxmlformats.org/officeDocument/2006/relationships" xmlns:p="http://schemas.openxmlformats.org/presentationml/2006/main">
+  <p:cSld>
+    <p:spTree>
+      <p:nvGrpSpPr>
+        <p:cNvPr id="1" name=""/>
+        <p:cNvGrpSpPr/>
+        <p:nvPr/>
+      </p:nvGrpSpPr>
+      <p:grpSpPr>
+        <a:xfrm>
+          <a:off x="0" y="0"/>
+          <a:ext cx="0" cy="0"/>
+          <a:chOff x="0" y="0"/>
+          <a:chExt cx="0" cy="0"/>
+        </a:xfrm>
+      </p:grpSpPr>
+      <p:sp>
+        <p:nvSpPr>
+          <p:cNvPr id="2" name="Titel 1">
+            <a:extLst>
+              <a:ext uri="{FF2B5EF4-FFF2-40B4-BE49-F238E27FC236}">
+                <a16:creationId xmlns:a16="http://schemas.microsoft.com/office/drawing/2014/main" id="{10170B52-4088-4336-92A2-9EBBC266E5AC}"/>
+              </a:ext>
+            </a:extLst>
+          </p:cNvPr>
+          <p:cNvSpPr>
+            <a:spLocks noGrp="1"/>
+          </p:cNvSpPr>
+          <p:nvPr>
+            <p:ph type="title"/>
+          </p:nvPr>
+        </p:nvSpPr>
+        <p:spPr/>
+        <p:txBody>
+          <a:bodyPr/>
+          <a:lstStyle/>
+          <a:p>
+            <a:r>
+              <a:rPr lang="de-DE" dirty="0"/>
+              <a:t>Runde 5: Verbreitung</a:t>
+            </a:r>
+          </a:p>
+        </p:txBody>
+      </p:sp>
+      <p:sp>
+        <p:nvSpPr>
+          <p:cNvPr id="3" name="Textplatzhalter 2">
+            <a:extLst>
+              <a:ext uri="{FF2B5EF4-FFF2-40B4-BE49-F238E27FC236}">
+                <a16:creationId xmlns:a16="http://schemas.microsoft.com/office/drawing/2014/main" id="{8A03BB39-1F7C-4F43-9FA7-257060B076A6}"/>
+              </a:ext>
+            </a:extLst>
+          </p:cNvPr>
+          <p:cNvSpPr>
+            <a:spLocks noGrp="1"/>
+          </p:cNvSpPr>
+          <p:nvPr>
+            <p:ph type="body" idx="1"/>
+          </p:nvPr>
+        </p:nvSpPr>
+        <p:spPr/>
+        <p:txBody>
+          <a:bodyPr/>
+          <a:lstStyle/>
+          <a:p>
+            <a:endParaRPr lang="de-DE"/>
+          </a:p>
+        </p:txBody>
+      </p:sp>
+      <p:sp>
+        <p:nvSpPr>
+          <p:cNvPr id="4" name="Fußzeilenplatzhalter 3">
+            <a:extLst>
+              <a:ext uri="{FF2B5EF4-FFF2-40B4-BE49-F238E27FC236}">
+                <a16:creationId xmlns:a16="http://schemas.microsoft.com/office/drawing/2014/main" id="{FCB84CA1-4CDA-4243-B812-17A0EDF01838}"/>
+              </a:ext>
+            </a:extLst>
+          </p:cNvPr>
+          <p:cNvSpPr>
+            <a:spLocks noGrp="1"/>
+          </p:cNvSpPr>
+          <p:nvPr>
+            <p:ph type="ftr" sz="quarter" idx="11"/>
+          </p:nvPr>
+        </p:nvSpPr>
+        <p:spPr/>
+        <p:txBody>
+          <a:bodyPr/>
+          <a:lstStyle/>
+          <a:p>
+            <a:r>
+              <a:rPr lang="de-DE"/>
+              <a:t>Thorben Schomacker &amp; Ferdinand Trendelenburg</a:t>
+            </a:r>
+            <a:endParaRPr lang="de-DE" dirty="0"/>
+          </a:p>
+        </p:txBody>
+      </p:sp>
+      <p:sp>
+        <p:nvSpPr>
+          <p:cNvPr id="5" name="Foliennummernplatzhalter 4">
+            <a:extLst>
+              <a:ext uri="{FF2B5EF4-FFF2-40B4-BE49-F238E27FC236}">
+                <a16:creationId xmlns:a16="http://schemas.microsoft.com/office/drawing/2014/main" id="{A2AC6686-15B6-4DE7-92BF-2B5AF931CC86}"/>
+              </a:ext>
+            </a:extLst>
+          </p:cNvPr>
+          <p:cNvSpPr>
+            <a:spLocks noGrp="1"/>
+          </p:cNvSpPr>
+          <p:nvPr>
+            <p:ph type="sldNum" sz="quarter" idx="12"/>
+          </p:nvPr>
+        </p:nvSpPr>
+        <p:spPr/>
+        <p:txBody>
+          <a:bodyPr/>
+          <a:lstStyle/>
+          <a:p>
+            <a:fld id="{211E1A2D-EDD7-41B5-B3C6-ADA4DCBFAA23}" type="slidenum">
+              <a:rPr lang="de-DE" smtClean="0"/>
+              <a:t>20</a:t>
+            </a:fld>
+            <a:endParaRPr lang="de-DE"/>
+          </a:p>
+        </p:txBody>
+      </p:sp>
+    </p:spTree>
+    <p:extLst>
+      <p:ext uri="{BB962C8B-B14F-4D97-AF65-F5344CB8AC3E}">
+        <p14:creationId xmlns:p14="http://schemas.microsoft.com/office/powerpoint/2010/main" val="3601534781"/>
+      </p:ext>
+    </p:extLst>
+  </p:cSld>
+  <p:clrMapOvr>
+    <a:masterClrMapping/>
+  </p:clrMapOvr>
+</p:sld>
+</file>
+
+<file path=ppt/slides/slide21.xml><?xml version="1.0" encoding="utf-8"?>
+<p:sld xmlns:a="http://schemas.openxmlformats.org/drawingml/2006/main" xmlns:r="http://schemas.openxmlformats.org/officeDocument/2006/relationships" xmlns:p="http://schemas.openxmlformats.org/presentationml/2006/main">
+  <p:cSld>
+    <p:spTree>
+      <p:nvGrpSpPr>
+        <p:cNvPr id="1" name=""/>
+        <p:cNvGrpSpPr/>
+        <p:nvPr/>
+      </p:nvGrpSpPr>
+      <p:grpSpPr>
+        <a:xfrm>
+          <a:off x="0" y="0"/>
+          <a:ext cx="0" cy="0"/>
+          <a:chOff x="0" y="0"/>
+          <a:chExt cx="0" cy="0"/>
+        </a:xfrm>
+      </p:grpSpPr>
+      <p:sp>
+        <p:nvSpPr>
+          <p:cNvPr id="2" name="Fußzeilenplatzhalter 1">
+            <a:extLst>
+              <a:ext uri="{FF2B5EF4-FFF2-40B4-BE49-F238E27FC236}">
+                <a16:creationId xmlns:a16="http://schemas.microsoft.com/office/drawing/2014/main" id="{EF4CF9A5-91C7-4BE9-B2B4-6A66CDB6F345}"/>
+              </a:ext>
+            </a:extLst>
+          </p:cNvPr>
+          <p:cNvSpPr>
+            <a:spLocks noGrp="1"/>
+          </p:cNvSpPr>
+          <p:nvPr>
+            <p:ph type="ftr" sz="quarter" idx="11"/>
+          </p:nvPr>
+        </p:nvSpPr>
+        <p:spPr/>
+        <p:txBody>
+          <a:bodyPr/>
+          <a:lstStyle/>
+          <a:p>
+            <a:r>
+              <a:rPr lang="de-DE"/>
+              <a:t>Thorben Schomacker &amp; Ferdinand Trendelenburg</a:t>
+            </a:r>
+          </a:p>
+        </p:txBody>
+      </p:sp>
+      <p:sp>
+        <p:nvSpPr>
+          <p:cNvPr id="3" name="Foliennummernplatzhalter 2">
+            <a:extLst>
+              <a:ext uri="{FF2B5EF4-FFF2-40B4-BE49-F238E27FC236}">
+                <a16:creationId xmlns:a16="http://schemas.microsoft.com/office/drawing/2014/main" id="{63FB2FC6-C48D-4E17-A88A-6F3CA6A096BB}"/>
+              </a:ext>
+            </a:extLst>
+          </p:cNvPr>
+          <p:cNvSpPr>
+            <a:spLocks noGrp="1"/>
+          </p:cNvSpPr>
+          <p:nvPr>
+            <p:ph type="sldNum" sz="quarter" idx="12"/>
+          </p:nvPr>
+        </p:nvSpPr>
+        <p:spPr/>
+        <p:txBody>
+          <a:bodyPr/>
+          <a:lstStyle/>
+          <a:p>
+            <a:fld id="{211E1A2D-EDD7-41B5-B3C6-ADA4DCBFAA23}" type="slidenum">
+              <a:rPr lang="de-DE" smtClean="0"/>
+              <a:t>21</a:t>
+            </a:fld>
+            <a:endParaRPr lang="de-DE"/>
+          </a:p>
+        </p:txBody>
+      </p:sp>
+      <p:pic>
+        <p:nvPicPr>
+          <p:cNvPr id="4" name="Grafik 3">
+            <a:extLst>
+              <a:ext uri="{FF2B5EF4-FFF2-40B4-BE49-F238E27FC236}">
+                <a16:creationId xmlns:a16="http://schemas.microsoft.com/office/drawing/2014/main" id="{4F7FD5C6-DBFD-4CA5-823A-C3C20D951CFB}"/>
+              </a:ext>
+            </a:extLst>
+          </p:cNvPr>
+          <p:cNvPicPr>
+            <a:picLocks noChangeAspect="1"/>
+          </p:cNvPicPr>
+          <p:nvPr/>
+        </p:nvPicPr>
+        <p:blipFill>
+          <a:blip r:embed="rId2"/>
+          <a:stretch>
+            <a:fillRect/>
+          </a:stretch>
+        </p:blipFill>
+        <p:spPr>
+          <a:xfrm>
+            <a:off x="-1" y="0"/>
+            <a:ext cx="12192001" cy="6858000"/>
+          </a:xfrm>
+          <a:prstGeom prst="rect">
+            <a:avLst/>
+          </a:prstGeom>
+        </p:spPr>
+      </p:pic>
+    </p:spTree>
+    <p:extLst>
+      <p:ext uri="{BB962C8B-B14F-4D97-AF65-F5344CB8AC3E}">
+        <p14:creationId xmlns:p14="http://schemas.microsoft.com/office/powerpoint/2010/main" val="2789734543"/>
+      </p:ext>
+    </p:extLst>
+  </p:cSld>
+  <p:clrMapOvr>
+    <a:masterClrMapping/>
+  </p:clrMapOvr>
+</p:sld>
+</file>
+
+<file path=ppt/slides/slide22.xml><?xml version="1.0" encoding="utf-8"?>
+<p:sld xmlns:a="http://schemas.openxmlformats.org/drawingml/2006/main" xmlns:r="http://schemas.openxmlformats.org/officeDocument/2006/relationships" xmlns:p="http://schemas.openxmlformats.org/presentationml/2006/main">
+  <p:cSld>
+    <p:spTree>
+      <p:nvGrpSpPr>
+        <p:cNvPr id="1" name=""/>
+        <p:cNvGrpSpPr/>
+        <p:nvPr/>
+      </p:nvGrpSpPr>
+      <p:grpSpPr>
+        <a:xfrm>
+          <a:off x="0" y="0"/>
+          <a:ext cx="0" cy="0"/>
+          <a:chOff x="0" y="0"/>
+          <a:chExt cx="0" cy="0"/>
+        </a:xfrm>
+      </p:grpSpPr>
+      <p:pic>
+        <p:nvPicPr>
+          <p:cNvPr id="8" name="Inhaltsplatzhalter 7" descr="Ein Bild, das Objekt enthält.&#10;&#10;Automatisch generierte Beschreibung">
+            <a:extLst>
+              <a:ext uri="{FF2B5EF4-FFF2-40B4-BE49-F238E27FC236}">
+                <a16:creationId xmlns:a16="http://schemas.microsoft.com/office/drawing/2014/main" id="{9B29D1D3-D864-4E9D-9304-71545F81C8FC}"/>
+              </a:ext>
+            </a:extLst>
+          </p:cNvPr>
+          <p:cNvPicPr>
+            <a:picLocks noGrp="1" noChangeAspect="1"/>
+          </p:cNvPicPr>
+          <p:nvPr>
+            <p:ph sz="half" idx="1"/>
+          </p:nvPr>
+        </p:nvPicPr>
+        <p:blipFill>
+          <a:blip r:embed="rId2" cstate="print">
+            <a:extLst>
+              <a:ext uri="{28A0092B-C50C-407E-A947-70E740481C1C}">
+                <a14:useLocalDpi xmlns:a14="http://schemas.microsoft.com/office/drawing/2010/main" val="0"/>
+              </a:ext>
+            </a:extLst>
+          </a:blip>
+          <a:stretch>
+            <a:fillRect/>
+          </a:stretch>
+        </p:blipFill>
+        <p:spPr>
+          <a:xfrm>
+            <a:off x="838200" y="2219621"/>
+            <a:ext cx="5181600" cy="3563346"/>
+          </a:xfrm>
+        </p:spPr>
+      </p:pic>
+      <p:pic>
+        <p:nvPicPr>
+          <p:cNvPr id="13" name="Inhaltsplatzhalter 12">
+            <a:extLst>
+              <a:ext uri="{FF2B5EF4-FFF2-40B4-BE49-F238E27FC236}">
+                <a16:creationId xmlns:a16="http://schemas.microsoft.com/office/drawing/2014/main" id="{3CAF4226-8DDA-442D-9E78-C2C73F4CB818}"/>
+              </a:ext>
+            </a:extLst>
+          </p:cNvPr>
+          <p:cNvPicPr>
+            <a:picLocks noGrp="1" noChangeAspect="1"/>
+          </p:cNvPicPr>
+          <p:nvPr>
+            <p:ph sz="half" idx="2"/>
+          </p:nvPr>
+        </p:nvPicPr>
+        <p:blipFill>
+          <a:blip r:embed="rId3">
+            <a:extLst>
+              <a:ext uri="{28A0092B-C50C-407E-A947-70E740481C1C}">
+                <a14:useLocalDpi xmlns:a14="http://schemas.microsoft.com/office/drawing/2010/main" val="0"/>
+              </a:ext>
+            </a:extLst>
+          </a:blip>
+          <a:stretch>
+            <a:fillRect/>
+          </a:stretch>
+        </p:blipFill>
+        <p:spPr>
+          <a:xfrm>
+            <a:off x="6587331" y="1825625"/>
+            <a:ext cx="4351338" cy="4351338"/>
+          </a:xfrm>
+        </p:spPr>
+      </p:pic>
+      <p:sp>
+        <p:nvSpPr>
+          <p:cNvPr id="4" name="Fußzeilenplatzhalter 3">
+            <a:extLst>
+              <a:ext uri="{FF2B5EF4-FFF2-40B4-BE49-F238E27FC236}">
+                <a16:creationId xmlns:a16="http://schemas.microsoft.com/office/drawing/2014/main" id="{647F42DC-AE05-463C-9BFA-FA50B8164724}"/>
+              </a:ext>
+            </a:extLst>
+          </p:cNvPr>
+          <p:cNvSpPr>
+            <a:spLocks noGrp="1"/>
+          </p:cNvSpPr>
+          <p:nvPr>
+            <p:ph type="ftr" sz="quarter" idx="11"/>
+          </p:nvPr>
+        </p:nvSpPr>
+        <p:spPr/>
+        <p:txBody>
+          <a:bodyPr/>
+          <a:lstStyle/>
+          <a:p>
+            <a:r>
+              <a:rPr lang="de-DE"/>
+              <a:t>Thorben Schomacker &amp; Ferdinand Trendelenburg</a:t>
+            </a:r>
+          </a:p>
+        </p:txBody>
+      </p:sp>
+      <p:sp>
+        <p:nvSpPr>
+          <p:cNvPr id="5" name="Foliennummernplatzhalter 4">
+            <a:extLst>
+              <a:ext uri="{FF2B5EF4-FFF2-40B4-BE49-F238E27FC236}">
+                <a16:creationId xmlns:a16="http://schemas.microsoft.com/office/drawing/2014/main" id="{746500C1-46E9-4DA2-9E11-7626E8B3A0CB}"/>
+              </a:ext>
+            </a:extLst>
+          </p:cNvPr>
+          <p:cNvSpPr>
+            <a:spLocks noGrp="1"/>
+          </p:cNvSpPr>
+          <p:nvPr>
+            <p:ph type="sldNum" sz="quarter" idx="12"/>
+          </p:nvPr>
+        </p:nvSpPr>
+        <p:spPr/>
+        <p:txBody>
+          <a:bodyPr/>
+          <a:lstStyle/>
+          <a:p>
+            <a:fld id="{211E1A2D-EDD7-41B5-B3C6-ADA4DCBFAA23}" type="slidenum">
+              <a:rPr lang="de-DE" smtClean="0"/>
+              <a:t>22</a:t>
+            </a:fld>
+            <a:endParaRPr lang="de-DE"/>
+          </a:p>
+        </p:txBody>
+      </p:sp>
+      <p:sp>
+        <p:nvSpPr>
+          <p:cNvPr id="6" name="Titel 5">
+            <a:extLst>
+              <a:ext uri="{FF2B5EF4-FFF2-40B4-BE49-F238E27FC236}">
+                <a16:creationId xmlns:a16="http://schemas.microsoft.com/office/drawing/2014/main" id="{C88EED91-7CDA-487F-8132-709512156B90}"/>
+              </a:ext>
+            </a:extLst>
+          </p:cNvPr>
+          <p:cNvSpPr>
+            <a:spLocks noGrp="1"/>
+          </p:cNvSpPr>
+          <p:nvPr>
+            <p:ph type="title"/>
+          </p:nvPr>
+        </p:nvSpPr>
+        <p:spPr/>
+        <p:txBody>
+          <a:bodyPr/>
+          <a:lstStyle/>
+          <a:p>
+            <a:r>
+              <a:rPr lang="de-DE" dirty="0"/>
+              <a:t>Der Vergleich</a:t>
+            </a:r>
+          </a:p>
+        </p:txBody>
+      </p:sp>
+      <p:sp>
+        <p:nvSpPr>
+          <p:cNvPr id="9" name="Textfeld 8">
+            <a:extLst>
+              <a:ext uri="{FF2B5EF4-FFF2-40B4-BE49-F238E27FC236}">
+                <a16:creationId xmlns:a16="http://schemas.microsoft.com/office/drawing/2014/main" id="{26C8C4A0-50B8-46B0-BC46-C6FF2FA2A181}"/>
+              </a:ext>
+            </a:extLst>
+          </p:cNvPr>
+          <p:cNvSpPr txBox="1"/>
+          <p:nvPr/>
+        </p:nvSpPr>
+        <p:spPr>
+          <a:xfrm flipH="1">
+            <a:off x="838200" y="5866547"/>
+            <a:ext cx="5181600" cy="400110"/>
+          </a:xfrm>
+          <a:prstGeom prst="rect">
+            <a:avLst/>
+          </a:prstGeom>
+          <a:noFill/>
+        </p:spPr>
+        <p:txBody>
+          <a:bodyPr wrap="square" rtlCol="0">
+            <a:spAutoFit/>
+          </a:bodyPr>
+          <a:lstStyle/>
+          <a:p>
+            <a:r>
+              <a:rPr lang="de-DE" sz="1000" dirty="0"/>
+              <a:t>http://www.lib.washington.edu/dataservices/images/Tableau_Software_logo.png/image_view_fullscreen</a:t>
+            </a:r>
+          </a:p>
+        </p:txBody>
+      </p:sp>
+      <p:sp>
+        <p:nvSpPr>
+          <p:cNvPr id="14" name="Textfeld 13">
+            <a:extLst>
+              <a:ext uri="{FF2B5EF4-FFF2-40B4-BE49-F238E27FC236}">
+                <a16:creationId xmlns:a16="http://schemas.microsoft.com/office/drawing/2014/main" id="{B4D8491D-7391-433B-B3A3-E8DD3D53FAD0}"/>
+              </a:ext>
+            </a:extLst>
+          </p:cNvPr>
+          <p:cNvSpPr txBox="1"/>
+          <p:nvPr/>
+        </p:nvSpPr>
+        <p:spPr>
+          <a:xfrm flipH="1">
+            <a:off x="6172202" y="5712659"/>
+            <a:ext cx="5181600" cy="553998"/>
+          </a:xfrm>
+          <a:prstGeom prst="rect">
+            <a:avLst/>
+          </a:prstGeom>
+          <a:noFill/>
+        </p:spPr>
+        <p:txBody>
+          <a:bodyPr wrap="square" rtlCol="0">
+            <a:spAutoFit/>
+          </a:bodyPr>
+          <a:lstStyle/>
+          <a:p>
+            <a:r>
+              <a:rPr lang="de-DE" sz="1000" dirty="0"/>
+              <a:t>https://is1-ssl.mzstatic.com/image/thumb/Purple118/v4/d4/39/0e/d4390eda-8301-11dd-14f5-01620b055552/iPadAppIcon-1x_U007emarketing-0-0-GLES2_U002c0-512MB-sRGB-0-0-0-85-220-0-0-0-5.png/1200x630bb.jpg</a:t>
+            </a:r>
+          </a:p>
+        </p:txBody>
+      </p:sp>
+      <p:sp>
+        <p:nvSpPr>
+          <p:cNvPr id="2" name="Textfeld 1">
+            <a:extLst>
+              <a:ext uri="{FF2B5EF4-FFF2-40B4-BE49-F238E27FC236}">
+                <a16:creationId xmlns:a16="http://schemas.microsoft.com/office/drawing/2014/main" id="{02A70397-77D9-4CCF-B381-ED23888FEF39}"/>
+              </a:ext>
+            </a:extLst>
+          </p:cNvPr>
+          <p:cNvSpPr txBox="1"/>
+          <p:nvPr/>
+        </p:nvSpPr>
+        <p:spPr>
+          <a:xfrm>
+            <a:off x="2990295" y="1206709"/>
+            <a:ext cx="877410" cy="1569660"/>
+          </a:xfrm>
+          <a:prstGeom prst="rect">
+            <a:avLst/>
+          </a:prstGeom>
+          <a:noFill/>
+        </p:spPr>
+        <p:txBody>
+          <a:bodyPr wrap="square" rtlCol="0">
+            <a:spAutoFit/>
+          </a:bodyPr>
+          <a:lstStyle/>
+          <a:p>
+            <a:r>
+              <a:rPr lang="de-DE" sz="9600" dirty="0"/>
+              <a:t>4</a:t>
+            </a:r>
+          </a:p>
+        </p:txBody>
+      </p:sp>
+      <p:sp>
+        <p:nvSpPr>
+          <p:cNvPr id="12" name="Textfeld 11">
+            <a:extLst>
+              <a:ext uri="{FF2B5EF4-FFF2-40B4-BE49-F238E27FC236}">
+                <a16:creationId xmlns:a16="http://schemas.microsoft.com/office/drawing/2014/main" id="{3112B90C-4797-4D90-A47A-0FD0BD074CDF}"/>
+              </a:ext>
+            </a:extLst>
+          </p:cNvPr>
+          <p:cNvSpPr txBox="1"/>
+          <p:nvPr/>
+        </p:nvSpPr>
+        <p:spPr>
+          <a:xfrm>
+            <a:off x="8324295" y="1206709"/>
+            <a:ext cx="877410" cy="1569660"/>
+          </a:xfrm>
+          <a:prstGeom prst="rect">
+            <a:avLst/>
+          </a:prstGeom>
+          <a:noFill/>
+        </p:spPr>
+        <p:txBody>
+          <a:bodyPr wrap="square" rtlCol="0">
+            <a:spAutoFit/>
+          </a:bodyPr>
+          <a:lstStyle/>
+          <a:p>
+            <a:r>
+              <a:rPr lang="de-DE" sz="9600" dirty="0"/>
+              <a:t>3</a:t>
+            </a:r>
+          </a:p>
+        </p:txBody>
+      </p:sp>
+    </p:spTree>
+    <p:extLst>
+      <p:ext uri="{BB962C8B-B14F-4D97-AF65-F5344CB8AC3E}">
+        <p14:creationId xmlns:p14="http://schemas.microsoft.com/office/powerpoint/2010/main" val="698282988"/>
+      </p:ext>
+    </p:extLst>
+  </p:cSld>
+  <p:clrMapOvr>
+    <a:masterClrMapping/>
+  </p:clrMapOvr>
+</p:sld>
+</file>
+
+<file path=ppt/slides/slide23.xml><?xml version="1.0" encoding="utf-8"?>
+<p:sld xmlns:a="http://schemas.openxmlformats.org/drawingml/2006/main" xmlns:r="http://schemas.openxmlformats.org/officeDocument/2006/relationships" xmlns:p="http://schemas.openxmlformats.org/presentationml/2006/main">
+  <p:cSld>
+    <p:spTree>
+      <p:nvGrpSpPr>
+        <p:cNvPr id="1" name=""/>
+        <p:cNvGrpSpPr/>
+        <p:nvPr/>
+      </p:nvGrpSpPr>
+      <p:grpSpPr>
+        <a:xfrm>
+          <a:off x="0" y="0"/>
+          <a:ext cx="0" cy="0"/>
+          <a:chOff x="0" y="0"/>
+          <a:chExt cx="0" cy="0"/>
+        </a:xfrm>
+      </p:grpSpPr>
+      <p:sp>
+        <p:nvSpPr>
+          <p:cNvPr id="2" name="Titel 1">
+            <a:extLst>
+              <a:ext uri="{FF2B5EF4-FFF2-40B4-BE49-F238E27FC236}">
+                <a16:creationId xmlns:a16="http://schemas.microsoft.com/office/drawing/2014/main" id="{10170B52-4088-4336-92A2-9EBBC266E5AC}"/>
+              </a:ext>
+            </a:extLst>
+          </p:cNvPr>
+          <p:cNvSpPr>
+            <a:spLocks noGrp="1"/>
+          </p:cNvSpPr>
+          <p:nvPr>
+            <p:ph type="title"/>
+          </p:nvPr>
+        </p:nvSpPr>
+        <p:spPr/>
+        <p:txBody>
+          <a:bodyPr/>
+          <a:lstStyle/>
+          <a:p>
+            <a:r>
+              <a:rPr lang="de-DE" dirty="0"/>
+              <a:t>Runde 6: Persönlicher Eindruck der Anwender</a:t>
+            </a:r>
+          </a:p>
+        </p:txBody>
+      </p:sp>
+      <p:sp>
+        <p:nvSpPr>
+          <p:cNvPr id="3" name="Textplatzhalter 2">
+            <a:extLst>
+              <a:ext uri="{FF2B5EF4-FFF2-40B4-BE49-F238E27FC236}">
+                <a16:creationId xmlns:a16="http://schemas.microsoft.com/office/drawing/2014/main" id="{8A03BB39-1F7C-4F43-9FA7-257060B076A6}"/>
+              </a:ext>
+            </a:extLst>
+          </p:cNvPr>
+          <p:cNvSpPr>
+            <a:spLocks noGrp="1"/>
+          </p:cNvSpPr>
+          <p:nvPr>
+            <p:ph type="body" idx="1"/>
+          </p:nvPr>
+        </p:nvSpPr>
+        <p:spPr/>
+        <p:txBody>
+          <a:bodyPr/>
+          <a:lstStyle/>
+          <a:p>
+            <a:endParaRPr lang="de-DE"/>
+          </a:p>
+        </p:txBody>
+      </p:sp>
+      <p:sp>
+        <p:nvSpPr>
+          <p:cNvPr id="4" name="Fußzeilenplatzhalter 3">
+            <a:extLst>
+              <a:ext uri="{FF2B5EF4-FFF2-40B4-BE49-F238E27FC236}">
+                <a16:creationId xmlns:a16="http://schemas.microsoft.com/office/drawing/2014/main" id="{FCB84CA1-4CDA-4243-B812-17A0EDF01838}"/>
+              </a:ext>
+            </a:extLst>
+          </p:cNvPr>
+          <p:cNvSpPr>
+            <a:spLocks noGrp="1"/>
+          </p:cNvSpPr>
+          <p:nvPr>
+            <p:ph type="ftr" sz="quarter" idx="11"/>
+          </p:nvPr>
+        </p:nvSpPr>
+        <p:spPr/>
+        <p:txBody>
+          <a:bodyPr/>
+          <a:lstStyle/>
+          <a:p>
+            <a:r>
+              <a:rPr lang="de-DE"/>
+              <a:t>Thorben Schomacker &amp; Ferdinand Trendelenburg</a:t>
+            </a:r>
+            <a:endParaRPr lang="de-DE" dirty="0"/>
+          </a:p>
+        </p:txBody>
+      </p:sp>
+      <p:sp>
+        <p:nvSpPr>
+          <p:cNvPr id="5" name="Foliennummernplatzhalter 4">
+            <a:extLst>
+              <a:ext uri="{FF2B5EF4-FFF2-40B4-BE49-F238E27FC236}">
+                <a16:creationId xmlns:a16="http://schemas.microsoft.com/office/drawing/2014/main" id="{A2AC6686-15B6-4DE7-92BF-2B5AF931CC86}"/>
+              </a:ext>
+            </a:extLst>
+          </p:cNvPr>
+          <p:cNvSpPr>
+            <a:spLocks noGrp="1"/>
+          </p:cNvSpPr>
+          <p:nvPr>
+            <p:ph type="sldNum" sz="quarter" idx="12"/>
+          </p:nvPr>
+        </p:nvSpPr>
+        <p:spPr/>
+        <p:txBody>
+          <a:bodyPr/>
+          <a:lstStyle/>
+          <a:p>
+            <a:fld id="{211E1A2D-EDD7-41B5-B3C6-ADA4DCBFAA23}" type="slidenum">
+              <a:rPr lang="de-DE" smtClean="0"/>
+              <a:t>23</a:t>
+            </a:fld>
+            <a:endParaRPr lang="de-DE"/>
+          </a:p>
+        </p:txBody>
+      </p:sp>
+    </p:spTree>
+    <p:extLst>
+      <p:ext uri="{BB962C8B-B14F-4D97-AF65-F5344CB8AC3E}">
+        <p14:creationId xmlns:p14="http://schemas.microsoft.com/office/powerpoint/2010/main" val="835984742"/>
+      </p:ext>
+    </p:extLst>
+  </p:cSld>
+  <p:clrMapOvr>
+    <a:masterClrMapping/>
+  </p:clrMapOvr>
+</p:sld>
+</file>
+
+<file path=ppt/slides/slide24.xml><?xml version="1.0" encoding="utf-8"?>
+<p:sld xmlns:a="http://schemas.openxmlformats.org/drawingml/2006/main" xmlns:r="http://schemas.openxmlformats.org/officeDocument/2006/relationships" xmlns:p="http://schemas.openxmlformats.org/presentationml/2006/main">
+  <p:cSld>
+    <p:spTree>
+      <p:nvGrpSpPr>
+        <p:cNvPr id="1" name=""/>
+        <p:cNvGrpSpPr/>
+        <p:nvPr/>
+      </p:nvGrpSpPr>
+      <p:grpSpPr>
+        <a:xfrm>
+          <a:off x="0" y="0"/>
+          <a:ext cx="0" cy="0"/>
+          <a:chOff x="0" y="0"/>
+          <a:chExt cx="0" cy="0"/>
+        </a:xfrm>
+      </p:grpSpPr>
+      <p:sp>
+        <p:nvSpPr>
+          <p:cNvPr id="2" name="Titel 1">
+            <a:extLst>
+              <a:ext uri="{FF2B5EF4-FFF2-40B4-BE49-F238E27FC236}">
+                <a16:creationId xmlns:a16="http://schemas.microsoft.com/office/drawing/2014/main" id="{6C0298FA-A82D-4C18-845E-287A576D8763}"/>
+              </a:ext>
+            </a:extLst>
+          </p:cNvPr>
+          <p:cNvSpPr>
+            <a:spLocks noGrp="1"/>
+          </p:cNvSpPr>
+          <p:nvPr>
+            <p:ph type="title"/>
+          </p:nvPr>
+        </p:nvSpPr>
+        <p:spPr/>
+        <p:txBody>
+          <a:bodyPr/>
+          <a:lstStyle/>
+          <a:p>
+            <a:r>
+              <a:rPr lang="de-DE" dirty="0"/>
+              <a:t>Persönlicher Eindruck der Anwender</a:t>
+            </a:r>
+          </a:p>
+        </p:txBody>
+      </p:sp>
+      <p:sp>
+        <p:nvSpPr>
+          <p:cNvPr id="3" name="Inhaltsplatzhalter 2">
+            <a:extLst>
+              <a:ext uri="{FF2B5EF4-FFF2-40B4-BE49-F238E27FC236}">
+                <a16:creationId xmlns:a16="http://schemas.microsoft.com/office/drawing/2014/main" id="{34DC0D89-D08B-4202-B512-BDB82325D8B1}"/>
+              </a:ext>
+            </a:extLst>
+          </p:cNvPr>
+          <p:cNvSpPr>
+            <a:spLocks noGrp="1"/>
+          </p:cNvSpPr>
+          <p:nvPr>
+            <p:ph idx="1"/>
+          </p:nvPr>
+        </p:nvSpPr>
+        <p:spPr/>
+        <p:txBody>
+          <a:bodyPr/>
+          <a:lstStyle/>
+          <a:p>
+            <a:r>
+              <a:rPr lang="de-DE" dirty="0"/>
+              <a:t>Beide sehr ähnlich in der Oberfläche und Bedienung</a:t>
+            </a:r>
+          </a:p>
+          <a:p>
+            <a:r>
+              <a:rPr lang="de-DE" dirty="0"/>
+              <a:t>Tableau hat das </a:t>
+            </a:r>
+            <a:r>
+              <a:rPr lang="de-DE" dirty="0" err="1"/>
+              <a:t>drag-and-drop</a:t>
+            </a:r>
+            <a:r>
+              <a:rPr lang="de-DE" dirty="0"/>
+              <a:t> etwas schöner gelöst</a:t>
+            </a:r>
+          </a:p>
+        </p:txBody>
+      </p:sp>
+      <p:sp>
+        <p:nvSpPr>
+          <p:cNvPr id="4" name="Fußzeilenplatzhalter 3">
+            <a:extLst>
+              <a:ext uri="{FF2B5EF4-FFF2-40B4-BE49-F238E27FC236}">
+                <a16:creationId xmlns:a16="http://schemas.microsoft.com/office/drawing/2014/main" id="{3DBE401C-9606-4AE4-AC03-700B8F5ACE52}"/>
+              </a:ext>
+            </a:extLst>
+          </p:cNvPr>
+          <p:cNvSpPr>
+            <a:spLocks noGrp="1"/>
+          </p:cNvSpPr>
+          <p:nvPr>
+            <p:ph type="ftr" sz="quarter" idx="11"/>
+          </p:nvPr>
+        </p:nvSpPr>
+        <p:spPr/>
+        <p:txBody>
+          <a:bodyPr/>
+          <a:lstStyle/>
+          <a:p>
+            <a:r>
+              <a:rPr lang="de-DE"/>
+              <a:t>Thorben Schomacker &amp; Ferdinand Trendelenburg</a:t>
+            </a:r>
+            <a:endParaRPr lang="de-DE" dirty="0"/>
+          </a:p>
+        </p:txBody>
+      </p:sp>
+      <p:sp>
+        <p:nvSpPr>
+          <p:cNvPr id="5" name="Foliennummernplatzhalter 4">
+            <a:extLst>
+              <a:ext uri="{FF2B5EF4-FFF2-40B4-BE49-F238E27FC236}">
+                <a16:creationId xmlns:a16="http://schemas.microsoft.com/office/drawing/2014/main" id="{A5F8063C-33DB-4B0F-B658-C28EE56126C0}"/>
+              </a:ext>
+            </a:extLst>
+          </p:cNvPr>
+          <p:cNvSpPr>
+            <a:spLocks noGrp="1"/>
+          </p:cNvSpPr>
+          <p:nvPr>
+            <p:ph type="sldNum" sz="quarter" idx="12"/>
+          </p:nvPr>
+        </p:nvSpPr>
+        <p:spPr/>
+        <p:txBody>
+          <a:bodyPr/>
+          <a:lstStyle/>
+          <a:p>
+            <a:fld id="{211E1A2D-EDD7-41B5-B3C6-ADA4DCBFAA23}" type="slidenum">
+              <a:rPr lang="de-DE" smtClean="0"/>
+              <a:t>24</a:t>
+            </a:fld>
+            <a:endParaRPr lang="de-DE"/>
+          </a:p>
+        </p:txBody>
+      </p:sp>
+    </p:spTree>
+    <p:extLst>
+      <p:ext uri="{BB962C8B-B14F-4D97-AF65-F5344CB8AC3E}">
+        <p14:creationId xmlns:p14="http://schemas.microsoft.com/office/powerpoint/2010/main" val="1144414682"/>
+      </p:ext>
+    </p:extLst>
+  </p:cSld>
+  <p:clrMapOvr>
+    <a:masterClrMapping/>
+  </p:clrMapOvr>
+</p:sld>
+</file>
+
+<file path=ppt/slides/slide25.xml><?xml version="1.0" encoding="utf-8"?>
+<p:sld xmlns:a="http://schemas.openxmlformats.org/drawingml/2006/main" xmlns:r="http://schemas.openxmlformats.org/officeDocument/2006/relationships" xmlns:p="http://schemas.openxmlformats.org/presentationml/2006/main">
+  <p:cSld>
+    <p:spTree>
+      <p:nvGrpSpPr>
+        <p:cNvPr id="1" name=""/>
+        <p:cNvGrpSpPr/>
+        <p:nvPr/>
+      </p:nvGrpSpPr>
+      <p:grpSpPr>
+        <a:xfrm>
+          <a:off x="0" y="0"/>
+          <a:ext cx="0" cy="0"/>
+          <a:chOff x="0" y="0"/>
+          <a:chExt cx="0" cy="0"/>
+        </a:xfrm>
+      </p:grpSpPr>
+      <p:pic>
+        <p:nvPicPr>
+          <p:cNvPr id="8" name="Inhaltsplatzhalter 7" descr="Ein Bild, das Objekt enthält.&#10;&#10;Automatisch generierte Beschreibung">
+            <a:extLst>
+              <a:ext uri="{FF2B5EF4-FFF2-40B4-BE49-F238E27FC236}">
+                <a16:creationId xmlns:a16="http://schemas.microsoft.com/office/drawing/2014/main" id="{9B29D1D3-D864-4E9D-9304-71545F81C8FC}"/>
+              </a:ext>
+            </a:extLst>
+          </p:cNvPr>
+          <p:cNvPicPr>
+            <a:picLocks noGrp="1" noChangeAspect="1"/>
+          </p:cNvPicPr>
+          <p:nvPr>
+            <p:ph sz="half" idx="1"/>
+          </p:nvPr>
+        </p:nvPicPr>
+        <p:blipFill>
+          <a:blip r:embed="rId2" cstate="print">
+            <a:extLst>
+              <a:ext uri="{28A0092B-C50C-407E-A947-70E740481C1C}">
+                <a14:useLocalDpi xmlns:a14="http://schemas.microsoft.com/office/drawing/2010/main" val="0"/>
+              </a:ext>
+            </a:extLst>
+          </a:blip>
+          <a:stretch>
+            <a:fillRect/>
+          </a:stretch>
+        </p:blipFill>
+        <p:spPr>
+          <a:xfrm>
+            <a:off x="838200" y="2219621"/>
+            <a:ext cx="5181600" cy="3563346"/>
+          </a:xfrm>
+        </p:spPr>
+      </p:pic>
+      <p:pic>
+        <p:nvPicPr>
+          <p:cNvPr id="13" name="Inhaltsplatzhalter 12">
+            <a:extLst>
+              <a:ext uri="{FF2B5EF4-FFF2-40B4-BE49-F238E27FC236}">
+                <a16:creationId xmlns:a16="http://schemas.microsoft.com/office/drawing/2014/main" id="{3CAF4226-8DDA-442D-9E78-C2C73F4CB818}"/>
+              </a:ext>
+            </a:extLst>
+          </p:cNvPr>
+          <p:cNvPicPr>
+            <a:picLocks noGrp="1" noChangeAspect="1"/>
+          </p:cNvPicPr>
+          <p:nvPr>
+            <p:ph sz="half" idx="2"/>
+          </p:nvPr>
+        </p:nvPicPr>
+        <p:blipFill>
+          <a:blip r:embed="rId3">
+            <a:extLst>
+              <a:ext uri="{28A0092B-C50C-407E-A947-70E740481C1C}">
+                <a14:useLocalDpi xmlns:a14="http://schemas.microsoft.com/office/drawing/2010/main" val="0"/>
+              </a:ext>
+            </a:extLst>
+          </a:blip>
+          <a:stretch>
+            <a:fillRect/>
+          </a:stretch>
+        </p:blipFill>
+        <p:spPr>
+          <a:xfrm>
+            <a:off x="6587331" y="1825625"/>
+            <a:ext cx="4351338" cy="4351338"/>
+          </a:xfrm>
+        </p:spPr>
+      </p:pic>
+      <p:sp>
+        <p:nvSpPr>
+          <p:cNvPr id="4" name="Fußzeilenplatzhalter 3">
+            <a:extLst>
+              <a:ext uri="{FF2B5EF4-FFF2-40B4-BE49-F238E27FC236}">
+                <a16:creationId xmlns:a16="http://schemas.microsoft.com/office/drawing/2014/main" id="{647F42DC-AE05-463C-9BFA-FA50B8164724}"/>
+              </a:ext>
+            </a:extLst>
+          </p:cNvPr>
+          <p:cNvSpPr>
+            <a:spLocks noGrp="1"/>
+          </p:cNvSpPr>
+          <p:nvPr>
+            <p:ph type="ftr" sz="quarter" idx="11"/>
+          </p:nvPr>
+        </p:nvSpPr>
+        <p:spPr/>
+        <p:txBody>
+          <a:bodyPr/>
+          <a:lstStyle/>
+          <a:p>
+            <a:r>
+              <a:rPr lang="de-DE"/>
+              <a:t>Thorben Schomacker &amp; Ferdinand Trendelenburg</a:t>
+            </a:r>
+          </a:p>
+        </p:txBody>
+      </p:sp>
+      <p:sp>
+        <p:nvSpPr>
+          <p:cNvPr id="5" name="Foliennummernplatzhalter 4">
+            <a:extLst>
+              <a:ext uri="{FF2B5EF4-FFF2-40B4-BE49-F238E27FC236}">
+                <a16:creationId xmlns:a16="http://schemas.microsoft.com/office/drawing/2014/main" id="{746500C1-46E9-4DA2-9E11-7626E8B3A0CB}"/>
+              </a:ext>
+            </a:extLst>
+          </p:cNvPr>
+          <p:cNvSpPr>
+            <a:spLocks noGrp="1"/>
+          </p:cNvSpPr>
+          <p:nvPr>
+            <p:ph type="sldNum" sz="quarter" idx="12"/>
+          </p:nvPr>
+        </p:nvSpPr>
+        <p:spPr/>
+        <p:txBody>
+          <a:bodyPr/>
+          <a:lstStyle/>
+          <a:p>
+            <a:fld id="{211E1A2D-EDD7-41B5-B3C6-ADA4DCBFAA23}" type="slidenum">
+              <a:rPr lang="de-DE" smtClean="0"/>
+              <a:t>25</a:t>
+            </a:fld>
+            <a:endParaRPr lang="de-DE"/>
+          </a:p>
+        </p:txBody>
+      </p:sp>
+      <p:sp>
+        <p:nvSpPr>
+          <p:cNvPr id="6" name="Titel 5">
+            <a:extLst>
+              <a:ext uri="{FF2B5EF4-FFF2-40B4-BE49-F238E27FC236}">
+                <a16:creationId xmlns:a16="http://schemas.microsoft.com/office/drawing/2014/main" id="{C88EED91-7CDA-487F-8132-709512156B90}"/>
+              </a:ext>
+            </a:extLst>
+          </p:cNvPr>
+          <p:cNvSpPr>
+            <a:spLocks noGrp="1"/>
+          </p:cNvSpPr>
+          <p:nvPr>
+            <p:ph type="title"/>
+          </p:nvPr>
+        </p:nvSpPr>
+        <p:spPr/>
+        <p:txBody>
+          <a:bodyPr/>
+          <a:lstStyle/>
+          <a:p>
+            <a:r>
+              <a:rPr lang="de-DE" dirty="0"/>
+              <a:t>Der Vergleich</a:t>
+            </a:r>
+          </a:p>
+        </p:txBody>
+      </p:sp>
+      <p:sp>
+        <p:nvSpPr>
+          <p:cNvPr id="9" name="Textfeld 8">
+            <a:extLst>
+              <a:ext uri="{FF2B5EF4-FFF2-40B4-BE49-F238E27FC236}">
+                <a16:creationId xmlns:a16="http://schemas.microsoft.com/office/drawing/2014/main" id="{26C8C4A0-50B8-46B0-BC46-C6FF2FA2A181}"/>
+              </a:ext>
+            </a:extLst>
+          </p:cNvPr>
+          <p:cNvSpPr txBox="1"/>
+          <p:nvPr/>
+        </p:nvSpPr>
+        <p:spPr>
+          <a:xfrm flipH="1">
+            <a:off x="838200" y="5866547"/>
+            <a:ext cx="5181600" cy="400110"/>
+          </a:xfrm>
+          <a:prstGeom prst="rect">
+            <a:avLst/>
+          </a:prstGeom>
+          <a:noFill/>
+        </p:spPr>
+        <p:txBody>
+          <a:bodyPr wrap="square" rtlCol="0">
+            <a:spAutoFit/>
+          </a:bodyPr>
+          <a:lstStyle/>
+          <a:p>
+            <a:r>
+              <a:rPr lang="de-DE" sz="1000" dirty="0"/>
+              <a:t>http://www.lib.washington.edu/dataservices/images/Tableau_Software_logo.png/image_view_fullscreen</a:t>
+            </a:r>
+          </a:p>
+        </p:txBody>
+      </p:sp>
+      <p:sp>
+        <p:nvSpPr>
+          <p:cNvPr id="14" name="Textfeld 13">
+            <a:extLst>
+              <a:ext uri="{FF2B5EF4-FFF2-40B4-BE49-F238E27FC236}">
+                <a16:creationId xmlns:a16="http://schemas.microsoft.com/office/drawing/2014/main" id="{B4D8491D-7391-433B-B3A3-E8DD3D53FAD0}"/>
+              </a:ext>
+            </a:extLst>
+          </p:cNvPr>
+          <p:cNvSpPr txBox="1"/>
+          <p:nvPr/>
+        </p:nvSpPr>
+        <p:spPr>
+          <a:xfrm flipH="1">
+            <a:off x="6172202" y="5712659"/>
+            <a:ext cx="5181600" cy="553998"/>
+          </a:xfrm>
+          <a:prstGeom prst="rect">
+            <a:avLst/>
+          </a:prstGeom>
+          <a:noFill/>
+        </p:spPr>
+        <p:txBody>
+          <a:bodyPr wrap="square" rtlCol="0">
+            <a:spAutoFit/>
+          </a:bodyPr>
+          <a:lstStyle/>
+          <a:p>
+            <a:r>
+              <a:rPr lang="de-DE" sz="1000" dirty="0"/>
+              <a:t>https://is1-ssl.mzstatic.com/image/thumb/Purple118/v4/d4/39/0e/d4390eda-8301-11dd-14f5-01620b055552/iPadAppIcon-1x_U007emarketing-0-0-GLES2_U002c0-512MB-sRGB-0-0-0-85-220-0-0-0-5.png/1200x630bb.jpg</a:t>
+            </a:r>
+          </a:p>
+        </p:txBody>
+      </p:sp>
+      <p:sp>
+        <p:nvSpPr>
+          <p:cNvPr id="2" name="Textfeld 1">
+            <a:extLst>
+              <a:ext uri="{FF2B5EF4-FFF2-40B4-BE49-F238E27FC236}">
+                <a16:creationId xmlns:a16="http://schemas.microsoft.com/office/drawing/2014/main" id="{02A70397-77D9-4CCF-B381-ED23888FEF39}"/>
+              </a:ext>
+            </a:extLst>
+          </p:cNvPr>
+          <p:cNvSpPr txBox="1"/>
+          <p:nvPr/>
+        </p:nvSpPr>
+        <p:spPr>
+          <a:xfrm>
+            <a:off x="2990295" y="1206709"/>
+            <a:ext cx="877410" cy="1569660"/>
+          </a:xfrm>
+          <a:prstGeom prst="rect">
+            <a:avLst/>
+          </a:prstGeom>
+          <a:noFill/>
+        </p:spPr>
+        <p:txBody>
+          <a:bodyPr wrap="square" rtlCol="0">
+            <a:spAutoFit/>
+          </a:bodyPr>
+          <a:lstStyle/>
+          <a:p>
+            <a:r>
+              <a:rPr lang="de-DE" sz="9600" dirty="0"/>
+              <a:t>5</a:t>
+            </a:r>
+          </a:p>
+        </p:txBody>
+      </p:sp>
+      <p:sp>
+        <p:nvSpPr>
+          <p:cNvPr id="12" name="Textfeld 11">
+            <a:extLst>
+              <a:ext uri="{FF2B5EF4-FFF2-40B4-BE49-F238E27FC236}">
+                <a16:creationId xmlns:a16="http://schemas.microsoft.com/office/drawing/2014/main" id="{3112B90C-4797-4D90-A47A-0FD0BD074CDF}"/>
+              </a:ext>
+            </a:extLst>
+          </p:cNvPr>
+          <p:cNvSpPr txBox="1"/>
+          <p:nvPr/>
+        </p:nvSpPr>
+        <p:spPr>
+          <a:xfrm>
+            <a:off x="8324295" y="1206709"/>
+            <a:ext cx="877410" cy="1569660"/>
+          </a:xfrm>
+          <a:prstGeom prst="rect">
+            <a:avLst/>
+          </a:prstGeom>
+          <a:noFill/>
+        </p:spPr>
+        <p:txBody>
+          <a:bodyPr wrap="square" rtlCol="0">
+            <a:spAutoFit/>
+          </a:bodyPr>
+          <a:lstStyle/>
+          <a:p>
+            <a:r>
+              <a:rPr lang="de-DE" sz="9600" dirty="0"/>
+              <a:t>4</a:t>
+            </a:r>
+          </a:p>
+        </p:txBody>
+      </p:sp>
+    </p:spTree>
+    <p:extLst>
+      <p:ext uri="{BB962C8B-B14F-4D97-AF65-F5344CB8AC3E}">
+        <p14:creationId xmlns:p14="http://schemas.microsoft.com/office/powerpoint/2010/main" val="2857426673"/>
+      </p:ext>
+    </p:extLst>
+  </p:cSld>
+  <p:clrMapOvr>
+    <a:masterClrMapping/>
+  </p:clrMapOvr>
+</p:sld>
+</file>
+
+<file path=ppt/slides/slide26.xml><?xml version="1.0" encoding="utf-8"?>
+<p:sld xmlns:a="http://schemas.openxmlformats.org/drawingml/2006/main" xmlns:r="http://schemas.openxmlformats.org/officeDocument/2006/relationships" xmlns:p="http://schemas.openxmlformats.org/presentationml/2006/main">
+  <p:cSld>
+    <p:spTree>
+      <p:nvGrpSpPr>
+        <p:cNvPr id="1" name=""/>
+        <p:cNvGrpSpPr/>
+        <p:nvPr/>
+      </p:nvGrpSpPr>
+      <p:grpSpPr>
+        <a:xfrm>
+          <a:off x="0" y="0"/>
+          <a:ext cx="0" cy="0"/>
+          <a:chOff x="0" y="0"/>
+          <a:chExt cx="0" cy="0"/>
+        </a:xfrm>
+      </p:grpSpPr>
+      <p:sp>
+        <p:nvSpPr>
+          <p:cNvPr id="2" name="Titel 1">
+            <a:extLst>
+              <a:ext uri="{FF2B5EF4-FFF2-40B4-BE49-F238E27FC236}">
+                <a16:creationId xmlns:a16="http://schemas.microsoft.com/office/drawing/2014/main" id="{9D59B21B-8836-4A6A-83B0-E7CDAB88459B}"/>
+              </a:ext>
+            </a:extLst>
+          </p:cNvPr>
+          <p:cNvSpPr>
+            <a:spLocks noGrp="1"/>
+          </p:cNvSpPr>
+          <p:nvPr>
+            <p:ph type="title"/>
+          </p:nvPr>
+        </p:nvSpPr>
+        <p:spPr/>
+        <p:txBody>
+          <a:bodyPr/>
+          <a:lstStyle/>
+          <a:p>
+            <a:r>
+              <a:rPr lang="de-DE" dirty="0"/>
+              <a:t>Endauswertung</a:t>
+            </a:r>
+          </a:p>
+        </p:txBody>
+      </p:sp>
+      <p:sp>
+        <p:nvSpPr>
+          <p:cNvPr id="3" name="Textplatzhalter 2">
+            <a:extLst>
+              <a:ext uri="{FF2B5EF4-FFF2-40B4-BE49-F238E27FC236}">
+                <a16:creationId xmlns:a16="http://schemas.microsoft.com/office/drawing/2014/main" id="{F6F78157-150D-4D7A-BF01-961B3051F95A}"/>
+              </a:ext>
+            </a:extLst>
+          </p:cNvPr>
+          <p:cNvSpPr>
+            <a:spLocks noGrp="1"/>
+          </p:cNvSpPr>
+          <p:nvPr>
+            <p:ph type="body" idx="1"/>
+          </p:nvPr>
+        </p:nvSpPr>
+        <p:spPr/>
+        <p:txBody>
+          <a:bodyPr/>
+          <a:lstStyle/>
+          <a:p>
+            <a:r>
+              <a:rPr lang="de-DE" dirty="0"/>
+              <a:t>Tableau</a:t>
+            </a:r>
+          </a:p>
+        </p:txBody>
+      </p:sp>
+      <p:sp>
+        <p:nvSpPr>
+          <p:cNvPr id="4" name="Inhaltsplatzhalter 3">
+            <a:extLst>
+              <a:ext uri="{FF2B5EF4-FFF2-40B4-BE49-F238E27FC236}">
+                <a16:creationId xmlns:a16="http://schemas.microsoft.com/office/drawing/2014/main" id="{4DCFF580-D458-4D32-8274-3550CAFB1F82}"/>
+              </a:ext>
+            </a:extLst>
+          </p:cNvPr>
+          <p:cNvSpPr>
+            <a:spLocks noGrp="1"/>
+          </p:cNvSpPr>
+          <p:nvPr>
+            <p:ph sz="half" idx="2"/>
+          </p:nvPr>
+        </p:nvSpPr>
+        <p:spPr/>
+        <p:txBody>
+          <a:bodyPr/>
+          <a:lstStyle/>
+          <a:p>
+            <a:r>
+              <a:rPr lang="de-DE" dirty="0"/>
+              <a:t>5/6 Runden </a:t>
+            </a:r>
+          </a:p>
+          <a:p>
+            <a:endParaRPr lang="de-DE" dirty="0">
+              <a:sym typeface="Wingdings" panose="05000000000000000000" pitchFamily="2" charset="2"/>
+            </a:endParaRPr>
+          </a:p>
+          <a:p>
+            <a:pPr marL="0" indent="0" algn="ctr">
+              <a:buNone/>
+            </a:pPr>
+            <a:r>
+              <a:rPr lang="de-DE" sz="4800" dirty="0">
+                <a:sym typeface="Wingdings" panose="05000000000000000000" pitchFamily="2" charset="2"/>
+              </a:rPr>
+              <a:t>83%</a:t>
+            </a:r>
+            <a:endParaRPr lang="de-DE" sz="4800" dirty="0"/>
+          </a:p>
+        </p:txBody>
+      </p:sp>
+      <p:sp>
+        <p:nvSpPr>
+          <p:cNvPr id="5" name="Textplatzhalter 4">
+            <a:extLst>
+              <a:ext uri="{FF2B5EF4-FFF2-40B4-BE49-F238E27FC236}">
+                <a16:creationId xmlns:a16="http://schemas.microsoft.com/office/drawing/2014/main" id="{3C1C501B-2ADE-4AB0-97E4-0B9728EC0345}"/>
+              </a:ext>
+            </a:extLst>
+          </p:cNvPr>
+          <p:cNvSpPr>
+            <a:spLocks noGrp="1"/>
+          </p:cNvSpPr>
+          <p:nvPr>
+            <p:ph type="body" sz="quarter" idx="3"/>
+          </p:nvPr>
+        </p:nvSpPr>
+        <p:spPr/>
+        <p:txBody>
+          <a:bodyPr/>
+          <a:lstStyle/>
+          <a:p>
+            <a:r>
+              <a:rPr lang="de-DE" dirty="0" err="1"/>
+              <a:t>MicroStrategy</a:t>
+            </a:r>
+            <a:endParaRPr lang="de-DE" dirty="0"/>
+          </a:p>
+        </p:txBody>
+      </p:sp>
+      <p:sp>
+        <p:nvSpPr>
+          <p:cNvPr id="6" name="Inhaltsplatzhalter 5">
+            <a:extLst>
+              <a:ext uri="{FF2B5EF4-FFF2-40B4-BE49-F238E27FC236}">
+                <a16:creationId xmlns:a16="http://schemas.microsoft.com/office/drawing/2014/main" id="{2D0EAD33-BDA6-4F1D-A1EA-3D3B7D4492B0}"/>
+              </a:ext>
+            </a:extLst>
+          </p:cNvPr>
+          <p:cNvSpPr>
+            <a:spLocks noGrp="1"/>
+          </p:cNvSpPr>
+          <p:nvPr>
+            <p:ph sz="quarter" idx="4"/>
+          </p:nvPr>
+        </p:nvSpPr>
+        <p:spPr/>
+        <p:txBody>
+          <a:bodyPr/>
+          <a:lstStyle/>
+          <a:p>
+            <a:r>
+              <a:rPr lang="de-DE" dirty="0"/>
+              <a:t>4/6 Runden </a:t>
+            </a:r>
+          </a:p>
+          <a:p>
+            <a:endParaRPr lang="de-DE" dirty="0">
+              <a:sym typeface="Wingdings" panose="05000000000000000000" pitchFamily="2" charset="2"/>
+            </a:endParaRPr>
+          </a:p>
+          <a:p>
+            <a:pPr marL="0" indent="0" algn="ctr">
+              <a:buNone/>
+            </a:pPr>
+            <a:r>
+              <a:rPr lang="de-DE" sz="4800" dirty="0">
+                <a:sym typeface="Wingdings" panose="05000000000000000000" pitchFamily="2" charset="2"/>
+              </a:rPr>
+              <a:t>66%</a:t>
+            </a:r>
+            <a:endParaRPr lang="de-DE" sz="4800" dirty="0"/>
+          </a:p>
+        </p:txBody>
+      </p:sp>
+      <p:sp>
+        <p:nvSpPr>
+          <p:cNvPr id="7" name="Fußzeilenplatzhalter 6">
+            <a:extLst>
+              <a:ext uri="{FF2B5EF4-FFF2-40B4-BE49-F238E27FC236}">
+                <a16:creationId xmlns:a16="http://schemas.microsoft.com/office/drawing/2014/main" id="{C5B21B61-A463-4115-8453-43BCBBC18393}"/>
+              </a:ext>
+            </a:extLst>
+          </p:cNvPr>
+          <p:cNvSpPr>
+            <a:spLocks noGrp="1"/>
+          </p:cNvSpPr>
+          <p:nvPr>
+            <p:ph type="ftr" sz="quarter" idx="11"/>
+          </p:nvPr>
+        </p:nvSpPr>
+        <p:spPr/>
+        <p:txBody>
+          <a:bodyPr/>
+          <a:lstStyle/>
+          <a:p>
+            <a:r>
+              <a:rPr lang="de-DE"/>
+              <a:t>Thorben Schomacker &amp; Ferdinand Trendelenburg</a:t>
+            </a:r>
+          </a:p>
+        </p:txBody>
+      </p:sp>
+      <p:sp>
+        <p:nvSpPr>
+          <p:cNvPr id="8" name="Foliennummernplatzhalter 7">
+            <a:extLst>
+              <a:ext uri="{FF2B5EF4-FFF2-40B4-BE49-F238E27FC236}">
+                <a16:creationId xmlns:a16="http://schemas.microsoft.com/office/drawing/2014/main" id="{0C4DFDF5-20F3-4873-A148-159D72E322FC}"/>
+              </a:ext>
+            </a:extLst>
+          </p:cNvPr>
+          <p:cNvSpPr>
+            <a:spLocks noGrp="1"/>
+          </p:cNvSpPr>
+          <p:nvPr>
+            <p:ph type="sldNum" sz="quarter" idx="12"/>
+          </p:nvPr>
+        </p:nvSpPr>
+        <p:spPr/>
+        <p:txBody>
+          <a:bodyPr/>
+          <a:lstStyle/>
+          <a:p>
+            <a:fld id="{211E1A2D-EDD7-41B5-B3C6-ADA4DCBFAA23}" type="slidenum">
+              <a:rPr lang="de-DE" smtClean="0"/>
+              <a:pPr/>
+              <a:t>26</a:t>
+            </a:fld>
+            <a:endParaRPr lang="de-DE"/>
+          </a:p>
+        </p:txBody>
+      </p:sp>
+    </p:spTree>
+    <p:extLst>
+      <p:ext uri="{BB962C8B-B14F-4D97-AF65-F5344CB8AC3E}">
+        <p14:creationId xmlns:p14="http://schemas.microsoft.com/office/powerpoint/2010/main" val="1767849342"/>
       </p:ext>
     </p:extLst>
   </p:cSld>
@@ -6304,7 +8585,7 @@
           <a:p>
             <a:r>
               <a:rPr lang="de-DE"/>
-              <a:t>Thorben Schomacker</a:t>
+              <a:t>Thorben Schomacker &amp; Ferdinand Trendelenburg</a:t>
             </a:r>
           </a:p>
         </p:txBody>
@@ -6630,7 +8911,7 @@
           <a:p>
             <a:r>
               <a:rPr lang="de-DE"/>
-              <a:t>Thorben Schomacker</a:t>
+              <a:t>Thorben Schomacker &amp; Ferdinand Trendelenburg</a:t>
             </a:r>
             <a:endParaRPr lang="de-DE" dirty="0"/>
           </a:p>
@@ -6824,7 +9105,7 @@
           <a:p>
             <a:r>
               <a:rPr lang="de-DE" dirty="0" err="1"/>
-              <a:t>Enbeded</a:t>
+              <a:t>Embeded</a:t>
             </a:r>
             <a:r>
               <a:rPr lang="de-DE" dirty="0"/>
@@ -6833,47 +9114,39 @@
           </a:p>
           <a:p>
             <a:r>
+              <a:rPr lang="de-DE" dirty="0"/>
+              <a:t>Dashboards für mobile Endgeräte</a:t>
+            </a:r>
+          </a:p>
+          <a:p>
+            <a:endParaRPr lang="de-DE" dirty="0"/>
+          </a:p>
+        </p:txBody>
+      </p:sp>
+      <p:sp>
+        <p:nvSpPr>
+          <p:cNvPr id="5" name="Textplatzhalter 4">
+            <a:extLst>
+              <a:ext uri="{FF2B5EF4-FFF2-40B4-BE49-F238E27FC236}">
+                <a16:creationId xmlns:a16="http://schemas.microsoft.com/office/drawing/2014/main" id="{42ED5A55-05EF-4A41-8AB4-4D5FB8A137D7}"/>
+              </a:ext>
+            </a:extLst>
+          </p:cNvPr>
+          <p:cNvSpPr>
+            <a:spLocks noGrp="1"/>
+          </p:cNvSpPr>
+          <p:nvPr>
+            <p:ph type="body" sz="quarter" idx="3"/>
+          </p:nvPr>
+        </p:nvSpPr>
+        <p:spPr/>
+        <p:txBody>
+          <a:bodyPr/>
+          <a:lstStyle/>
+          <a:p>
+            <a:r>
               <a:rPr lang="de-DE" dirty="0" err="1"/>
-              <a:t>Dashbooards</a:t>
-            </a:r>
-            <a:r>
-              <a:rPr lang="de-DE" dirty="0"/>
-              <a:t> für mobile Endgeräte</a:t>
-            </a:r>
-          </a:p>
-          <a:p>
-            <a:endParaRPr lang="de-DE" dirty="0"/>
-          </a:p>
-        </p:txBody>
-      </p:sp>
-      <p:sp>
-        <p:nvSpPr>
-          <p:cNvPr id="5" name="Textplatzhalter 4">
-            <a:extLst>
-              <a:ext uri="{FF2B5EF4-FFF2-40B4-BE49-F238E27FC236}">
-                <a16:creationId xmlns:a16="http://schemas.microsoft.com/office/drawing/2014/main" id="{42ED5A55-05EF-4A41-8AB4-4D5FB8A137D7}"/>
-              </a:ext>
-            </a:extLst>
-          </p:cNvPr>
-          <p:cNvSpPr>
-            <a:spLocks noGrp="1"/>
-          </p:cNvSpPr>
-          <p:nvPr>
-            <p:ph type="body" sz="quarter" idx="3"/>
-          </p:nvPr>
-        </p:nvSpPr>
-        <p:spPr/>
-        <p:txBody>
-          <a:bodyPr/>
-          <a:lstStyle/>
-          <a:p>
-            <a:r>
-              <a:rPr lang="de-DE" dirty="0"/>
-              <a:t>Micro </a:t>
-            </a:r>
-            <a:r>
-              <a:rPr lang="de-DE" dirty="0" err="1"/>
-              <a:t>Strategy</a:t>
+              <a:t>MicroStrategy</a:t>
             </a:r>
             <a:endParaRPr lang="de-DE" dirty="0"/>
           </a:p>
@@ -6986,7 +9259,7 @@
           <a:p>
             <a:r>
               <a:rPr lang="de-DE"/>
-              <a:t>Thorben Schomacker</a:t>
+              <a:t>Thorben Schomacker &amp; Ferdinand Trendelenburg</a:t>
             </a:r>
           </a:p>
         </p:txBody>
@@ -7237,12 +9510,8 @@
           <a:lstStyle/>
           <a:p>
             <a:r>
-              <a:rPr lang="de-DE" dirty="0"/>
-              <a:t>Micro </a:t>
-            </a:r>
-            <a:r>
               <a:rPr lang="de-DE" dirty="0" err="1"/>
-              <a:t>Strategy</a:t>
+              <a:t>MicroStrategy</a:t>
             </a:r>
             <a:endParaRPr lang="de-DE" dirty="0"/>
           </a:p>
@@ -7354,7 +9623,7 @@
           <a:p>
             <a:r>
               <a:rPr lang="de-DE"/>
-              <a:t>Thorben Schomacker</a:t>
+              <a:t>Thorben Schomacker &amp; Ferdinand Trendelenburg</a:t>
             </a:r>
           </a:p>
         </p:txBody>
@@ -7632,12 +9901,8 @@
           <a:lstStyle/>
           <a:p>
             <a:r>
-              <a:rPr lang="de-DE" dirty="0"/>
-              <a:t>Micro </a:t>
-            </a:r>
-            <a:r>
               <a:rPr lang="de-DE" dirty="0" err="1"/>
-              <a:t>Strategy</a:t>
+              <a:t>MicroStrategy</a:t>
             </a:r>
             <a:endParaRPr lang="de-DE" dirty="0"/>
           </a:p>
@@ -7698,7 +9963,7 @@
           <a:p>
             <a:r>
               <a:rPr lang="de-DE"/>
-              <a:t>Thorben Schomacker</a:t>
+              <a:t>Thorben Schomacker &amp; Ferdinand Trendelenburg</a:t>
             </a:r>
           </a:p>
         </p:txBody>
@@ -7891,7 +10156,7 @@
           <a:p>
             <a:r>
               <a:rPr lang="de-DE"/>
-              <a:t>Thorben Schomacker</a:t>
+              <a:t>Thorben Schomacker &amp; Ferdinand Trendelenburg</a:t>
             </a:r>
           </a:p>
         </p:txBody>
@@ -8146,7 +10411,7 @@
           <a:p>
             <a:r>
               <a:rPr lang="de-DE" dirty="0"/>
-              <a:t>Runde 2: Handhabung</a:t>
+              <a:t>Runde 2: Generelle Handhabung</a:t>
             </a:r>
           </a:p>
         </p:txBody>
@@ -8199,7 +10464,7 @@
           <a:p>
             <a:r>
               <a:rPr lang="de-DE"/>
-              <a:t>Thorben Schomacker</a:t>
+              <a:t>Thorben Schomacker &amp; Ferdinand Trendelenburg</a:t>
             </a:r>
             <a:endParaRPr lang="de-DE" dirty="0"/>
           </a:p>

</xml_diff>